<commit_message>
(Issue #6) updated class documents for project
</commit_message>
<xml_diff>
--- a/class-documents/JumpDeath.pptx
+++ b/class-documents/JumpDeath.pptx
@@ -11,10 +11,14 @@
     <p:sldId id="257" r:id="rId5"/>
     <p:sldId id="260" r:id="rId6"/>
     <p:sldId id="261" r:id="rId7"/>
-    <p:sldId id="262" r:id="rId8"/>
-    <p:sldId id="263" r:id="rId9"/>
-    <p:sldId id="264" r:id="rId10"/>
-    <p:sldId id="265" r:id="rId11"/>
+    <p:sldId id="266" r:id="rId8"/>
+    <p:sldId id="267" r:id="rId9"/>
+    <p:sldId id="268" r:id="rId10"/>
+    <p:sldId id="269" r:id="rId11"/>
+    <p:sldId id="262" r:id="rId12"/>
+    <p:sldId id="263" r:id="rId13"/>
+    <p:sldId id="264" r:id="rId14"/>
+    <p:sldId id="265" r:id="rId15"/>
   </p:sldIdLst>
   <p:sldSz cx="9144000" cy="6858000" type="screen4x3"/>
   <p:notesSz cx="6858000" cy="9144000"/>
@@ -113,6 +117,22 @@
       </a:defRPr>
     </a:lvl9pPr>
   </p:defaultTextStyle>
+  <p:extLst>
+    <p:ext uri="{EFAFB233-063F-42B5-8137-9DF3F51BA10A}">
+      <p15:sldGuideLst xmlns:p15="http://schemas.microsoft.com/office/powerpoint/2012/main">
+        <p15:guide id="1" orient="horz" pos="2160">
+          <p15:clr>
+            <a:srgbClr val="A4A3A4"/>
+          </p15:clr>
+        </p15:guide>
+        <p15:guide id="2" pos="2880">
+          <p15:clr>
+            <a:srgbClr val="A4A3A4"/>
+          </p15:clr>
+        </p15:guide>
+      </p15:sldGuideLst>
+    </p:ext>
+  </p:extLst>
 </p:presentation>
 </file>
 
@@ -3942,6 +3962,2348 @@
       </p:grpSpPr>
       <p:sp>
         <p:nvSpPr>
+          <p:cNvPr id="4" name="Title 1"/>
+          <p:cNvSpPr>
+            <a:spLocks noGrp="1"/>
+          </p:cNvSpPr>
+          <p:nvPr>
+            <p:ph type="title"/>
+          </p:nvPr>
+        </p:nvSpPr>
+        <p:spPr>
+          <a:xfrm>
+            <a:off x="457200" y="152400"/>
+            <a:ext cx="3886200" cy="1143000"/>
+          </a:xfrm>
+        </p:spPr>
+        <p:txBody>
+          <a:bodyPr>
+            <a:normAutofit/>
+          </a:bodyPr>
+          <a:lstStyle/>
+          <a:p>
+            <a:r>
+              <a:rPr lang="en-US" sz="4000" dirty="0" smtClean="0">
+                <a:solidFill>
+                  <a:srgbClr val="FF0000"/>
+                </a:solidFill>
+              </a:rPr>
+              <a:t>Game Flow</a:t>
+            </a:r>
+            <a:endParaRPr lang="en-US" sz="4000" dirty="0">
+              <a:solidFill>
+                <a:srgbClr val="FF0000"/>
+              </a:solidFill>
+            </a:endParaRPr>
+          </a:p>
+        </p:txBody>
+      </p:sp>
+      <p:sp>
+        <p:nvSpPr>
+          <p:cNvPr id="5" name="Title 1"/>
+          <p:cNvSpPr txBox="1">
+            <a:spLocks/>
+          </p:cNvSpPr>
+          <p:nvPr/>
+        </p:nvSpPr>
+        <p:spPr>
+          <a:xfrm>
+            <a:off x="4800600" y="160560"/>
+            <a:ext cx="3886200" cy="1143000"/>
+          </a:xfrm>
+          <a:prstGeom prst="rect">
+            <a:avLst/>
+          </a:prstGeom>
+        </p:spPr>
+        <p:txBody>
+          <a:bodyPr vert="horz" lIns="0" tIns="45720" rIns="0" bIns="0" anchor="b">
+            <a:normAutofit fontScale="90000"/>
+          </a:bodyPr>
+          <a:lstStyle>
+            <a:lvl1pPr algn="l" rtl="0" eaLnBrk="1" latinLnBrk="0" hangingPunct="1">
+              <a:spcBef>
+                <a:spcPct val="0"/>
+              </a:spcBef>
+              <a:buNone/>
+              <a:defRPr kumimoji="0" sz="5000" b="0" kern="1200">
+                <a:ln>
+                  <a:noFill/>
+                </a:ln>
+                <a:solidFill>
+                  <a:schemeClr val="tx2"/>
+                </a:solidFill>
+                <a:effectLst/>
+                <a:latin typeface="+mj-lt"/>
+                <a:ea typeface="+mj-ea"/>
+                <a:cs typeface="+mj-cs"/>
+              </a:defRPr>
+            </a:lvl1pPr>
+          </a:lstStyle>
+          <a:p>
+            <a:r>
+              <a:rPr lang="en-US" dirty="0" smtClean="0"/>
+              <a:t>Implementation</a:t>
+            </a:r>
+            <a:endParaRPr lang="en-US" dirty="0"/>
+          </a:p>
+        </p:txBody>
+      </p:sp>
+      <p:sp>
+        <p:nvSpPr>
+          <p:cNvPr id="2" name="Rectangle 1"/>
+          <p:cNvSpPr/>
+          <p:nvPr/>
+        </p:nvSpPr>
+        <p:spPr>
+          <a:xfrm>
+            <a:off x="76200" y="1295400"/>
+            <a:ext cx="9067800" cy="4801314"/>
+          </a:xfrm>
+          <a:prstGeom prst="rect">
+            <a:avLst/>
+          </a:prstGeom>
+        </p:spPr>
+        <p:txBody>
+          <a:bodyPr wrap="square">
+            <a:spAutoFit/>
+          </a:bodyPr>
+          <a:lstStyle/>
+          <a:p>
+            <a:r>
+              <a:rPr lang="en-US" dirty="0" err="1">
+                <a:solidFill>
+                  <a:srgbClr val="DCDCDC"/>
+                </a:solidFill>
+                <a:highlight>
+                  <a:srgbClr val="1E1E1E"/>
+                </a:highlight>
+                <a:latin typeface="Consolas" panose="020B0609020204030204" pitchFamily="49" charset="0"/>
+              </a:rPr>
+              <a:t>drawableObjects</a:t>
+            </a:r>
+            <a:endParaRPr lang="en-US" dirty="0">
+              <a:solidFill>
+                <a:srgbClr val="DCDCDC"/>
+              </a:solidFill>
+              <a:highlight>
+                <a:srgbClr val="1E1E1E"/>
+              </a:highlight>
+              <a:latin typeface="Consolas" panose="020B0609020204030204" pitchFamily="49" charset="0"/>
+            </a:endParaRPr>
+          </a:p>
+          <a:p>
+            <a:r>
+              <a:rPr lang="en-US" dirty="0" smtClean="0">
+                <a:solidFill>
+                  <a:srgbClr val="DCDCDC"/>
+                </a:solidFill>
+                <a:highlight>
+                  <a:srgbClr val="1E1E1E"/>
+                </a:highlight>
+                <a:latin typeface="Consolas" panose="020B0609020204030204" pitchFamily="49" charset="0"/>
+              </a:rPr>
+              <a:t> </a:t>
+            </a:r>
+            <a:r>
+              <a:rPr lang="en-US" dirty="0" smtClean="0">
+                <a:solidFill>
+                  <a:srgbClr val="B4B4B4"/>
+                </a:solidFill>
+                <a:highlight>
+                  <a:srgbClr val="1E1E1E"/>
+                </a:highlight>
+                <a:latin typeface="Consolas" panose="020B0609020204030204" pitchFamily="49" charset="0"/>
+              </a:rPr>
+              <a:t>.</a:t>
+            </a:r>
+            <a:r>
+              <a:rPr lang="en-US" dirty="0">
+                <a:solidFill>
+                  <a:srgbClr val="DCDCDC"/>
+                </a:solidFill>
+                <a:highlight>
+                  <a:srgbClr val="1E1E1E"/>
+                </a:highlight>
+                <a:latin typeface="Consolas" panose="020B0609020204030204" pitchFamily="49" charset="0"/>
+              </a:rPr>
+              <a:t>Where(</a:t>
+            </a:r>
+            <a:r>
+              <a:rPr lang="en-US" dirty="0" err="1">
+                <a:solidFill>
+                  <a:srgbClr val="DCDCDC"/>
+                </a:solidFill>
+                <a:highlight>
+                  <a:srgbClr val="1E1E1E"/>
+                </a:highlight>
+                <a:latin typeface="Consolas" panose="020B0609020204030204" pitchFamily="49" charset="0"/>
+              </a:rPr>
+              <a:t>i</a:t>
+            </a:r>
+            <a:r>
+              <a:rPr lang="en-US" dirty="0">
+                <a:solidFill>
+                  <a:srgbClr val="DCDCDC"/>
+                </a:solidFill>
+                <a:highlight>
+                  <a:srgbClr val="1E1E1E"/>
+                </a:highlight>
+                <a:latin typeface="Consolas" panose="020B0609020204030204" pitchFamily="49" charset="0"/>
+              </a:rPr>
+              <a:t> </a:t>
+            </a:r>
+            <a:r>
+              <a:rPr lang="en-US" dirty="0">
+                <a:solidFill>
+                  <a:srgbClr val="B4B4B4"/>
+                </a:solidFill>
+                <a:highlight>
+                  <a:srgbClr val="1E1E1E"/>
+                </a:highlight>
+                <a:latin typeface="Consolas" panose="020B0609020204030204" pitchFamily="49" charset="0"/>
+              </a:rPr>
+              <a:t>=&gt;</a:t>
+            </a:r>
+            <a:r>
+              <a:rPr lang="en-US" dirty="0">
+                <a:solidFill>
+                  <a:srgbClr val="DCDCDC"/>
+                </a:solidFill>
+                <a:highlight>
+                  <a:srgbClr val="1E1E1E"/>
+                </a:highlight>
+                <a:latin typeface="Consolas" panose="020B0609020204030204" pitchFamily="49" charset="0"/>
+              </a:rPr>
+              <a:t> </a:t>
+            </a:r>
+            <a:r>
+              <a:rPr lang="en-US" dirty="0" err="1" smtClean="0">
+                <a:solidFill>
+                  <a:srgbClr val="DCDCDC"/>
+                </a:solidFill>
+                <a:highlight>
+                  <a:srgbClr val="1E1E1E"/>
+                </a:highlight>
+                <a:latin typeface="Consolas" panose="020B0609020204030204" pitchFamily="49" charset="0"/>
+              </a:rPr>
+              <a:t>i</a:t>
+            </a:r>
+            <a:r>
+              <a:rPr lang="en-US" dirty="0" err="1" smtClean="0">
+                <a:solidFill>
+                  <a:srgbClr val="B4B4B4"/>
+                </a:solidFill>
+                <a:highlight>
+                  <a:srgbClr val="1E1E1E"/>
+                </a:highlight>
+                <a:latin typeface="Consolas" panose="020B0609020204030204" pitchFamily="49" charset="0"/>
+              </a:rPr>
+              <a:t>.</a:t>
+            </a:r>
+            <a:r>
+              <a:rPr lang="en-US" dirty="0" err="1" smtClean="0">
+                <a:solidFill>
+                  <a:srgbClr val="DCDCDC"/>
+                </a:solidFill>
+                <a:highlight>
+                  <a:srgbClr val="1E1E1E"/>
+                </a:highlight>
+                <a:latin typeface="Consolas" panose="020B0609020204030204" pitchFamily="49" charset="0"/>
+              </a:rPr>
+              <a:t>Alive</a:t>
+            </a:r>
+            <a:endParaRPr lang="en-US" dirty="0" smtClean="0">
+              <a:solidFill>
+                <a:srgbClr val="DCDCDC"/>
+              </a:solidFill>
+              <a:highlight>
+                <a:srgbClr val="1E1E1E"/>
+              </a:highlight>
+              <a:latin typeface="Consolas" panose="020B0609020204030204" pitchFamily="49" charset="0"/>
+            </a:endParaRPr>
+          </a:p>
+          <a:p>
+            <a:r>
+              <a:rPr lang="en-US" dirty="0" smtClean="0">
+                <a:solidFill>
+                  <a:srgbClr val="B4B4B4"/>
+                </a:solidFill>
+                <a:highlight>
+                  <a:srgbClr val="1E1E1E"/>
+                </a:highlight>
+                <a:latin typeface="Consolas" panose="020B0609020204030204" pitchFamily="49" charset="0"/>
+              </a:rPr>
+              <a:t>    &amp;&amp;</a:t>
+            </a:r>
+            <a:r>
+              <a:rPr lang="en-US" dirty="0" smtClean="0">
+                <a:solidFill>
+                  <a:srgbClr val="DCDCDC"/>
+                </a:solidFill>
+                <a:highlight>
+                  <a:srgbClr val="1E1E1E"/>
+                </a:highlight>
+                <a:latin typeface="Consolas" panose="020B0609020204030204" pitchFamily="49" charset="0"/>
+              </a:rPr>
+              <a:t> </a:t>
+            </a:r>
+            <a:r>
+              <a:rPr lang="en-US" dirty="0">
+                <a:solidFill>
+                  <a:srgbClr val="DCDCDC"/>
+                </a:solidFill>
+                <a:highlight>
+                  <a:srgbClr val="1E1E1E"/>
+                </a:highlight>
+                <a:latin typeface="Consolas" panose="020B0609020204030204" pitchFamily="49" charset="0"/>
+              </a:rPr>
+              <a:t>(</a:t>
+            </a:r>
+            <a:r>
+              <a:rPr lang="en-US" dirty="0" err="1">
+                <a:solidFill>
+                  <a:srgbClr val="DCDCDC"/>
+                </a:solidFill>
+                <a:highlight>
+                  <a:srgbClr val="1E1E1E"/>
+                </a:highlight>
+                <a:latin typeface="Consolas" panose="020B0609020204030204" pitchFamily="49" charset="0"/>
+              </a:rPr>
+              <a:t>i</a:t>
+            </a:r>
+            <a:r>
+              <a:rPr lang="en-US" dirty="0" err="1">
+                <a:solidFill>
+                  <a:srgbClr val="B4B4B4"/>
+                </a:solidFill>
+                <a:highlight>
+                  <a:srgbClr val="1E1E1E"/>
+                </a:highlight>
+                <a:latin typeface="Consolas" panose="020B0609020204030204" pitchFamily="49" charset="0"/>
+              </a:rPr>
+              <a:t>.</a:t>
+            </a:r>
+            <a:r>
+              <a:rPr lang="en-US" dirty="0" err="1">
+                <a:solidFill>
+                  <a:srgbClr val="DCDCDC"/>
+                </a:solidFill>
+                <a:highlight>
+                  <a:srgbClr val="1E1E1E"/>
+                </a:highlight>
+                <a:latin typeface="Consolas" panose="020B0609020204030204" pitchFamily="49" charset="0"/>
+              </a:rPr>
+              <a:t>Rectangle</a:t>
+            </a:r>
+            <a:r>
+              <a:rPr lang="en-US" dirty="0" err="1">
+                <a:solidFill>
+                  <a:srgbClr val="B4B4B4"/>
+                </a:solidFill>
+                <a:highlight>
+                  <a:srgbClr val="1E1E1E"/>
+                </a:highlight>
+                <a:latin typeface="Consolas" panose="020B0609020204030204" pitchFamily="49" charset="0"/>
+              </a:rPr>
+              <a:t>.</a:t>
+            </a:r>
+            <a:r>
+              <a:rPr lang="en-US" dirty="0" err="1">
+                <a:solidFill>
+                  <a:srgbClr val="DCDCDC"/>
+                </a:solidFill>
+                <a:highlight>
+                  <a:srgbClr val="1E1E1E"/>
+                </a:highlight>
+                <a:latin typeface="Consolas" panose="020B0609020204030204" pitchFamily="49" charset="0"/>
+              </a:rPr>
+              <a:t>Intersects</a:t>
+            </a:r>
+            <a:r>
+              <a:rPr lang="en-US" dirty="0">
+                <a:solidFill>
+                  <a:srgbClr val="DCDCDC"/>
+                </a:solidFill>
+                <a:highlight>
+                  <a:srgbClr val="1E1E1E"/>
+                </a:highlight>
+                <a:latin typeface="Consolas" panose="020B0609020204030204" pitchFamily="49" charset="0"/>
+              </a:rPr>
+              <a:t>(</a:t>
+            </a:r>
+            <a:r>
+              <a:rPr lang="en-US" dirty="0" err="1">
+                <a:solidFill>
+                  <a:srgbClr val="DCDCDC"/>
+                </a:solidFill>
+                <a:highlight>
+                  <a:srgbClr val="1E1E1E"/>
+                </a:highlight>
+                <a:latin typeface="Consolas" panose="020B0609020204030204" pitchFamily="49" charset="0"/>
+              </a:rPr>
+              <a:t>GamePlay</a:t>
+            </a:r>
+            <a:r>
+              <a:rPr lang="en-US" dirty="0" err="1">
+                <a:solidFill>
+                  <a:srgbClr val="B4B4B4"/>
+                </a:solidFill>
+                <a:highlight>
+                  <a:srgbClr val="1E1E1E"/>
+                </a:highlight>
+                <a:latin typeface="Consolas" panose="020B0609020204030204" pitchFamily="49" charset="0"/>
+              </a:rPr>
+              <a:t>.</a:t>
+            </a:r>
+            <a:r>
+              <a:rPr lang="en-US" dirty="0" err="1">
+                <a:solidFill>
+                  <a:srgbClr val="DCDCDC"/>
+                </a:solidFill>
+                <a:highlight>
+                  <a:srgbClr val="1E1E1E"/>
+                </a:highlight>
+                <a:latin typeface="Consolas" panose="020B0609020204030204" pitchFamily="49" charset="0"/>
+              </a:rPr>
+              <a:t>ViewPort</a:t>
+            </a:r>
+            <a:r>
+              <a:rPr lang="en-US" dirty="0">
+                <a:solidFill>
+                  <a:srgbClr val="DCDCDC"/>
+                </a:solidFill>
+                <a:highlight>
+                  <a:srgbClr val="1E1E1E"/>
+                </a:highlight>
+                <a:latin typeface="Consolas" panose="020B0609020204030204" pitchFamily="49" charset="0"/>
+              </a:rPr>
+              <a:t>) </a:t>
+            </a:r>
+            <a:r>
+              <a:rPr lang="en-US" dirty="0">
+                <a:solidFill>
+                  <a:srgbClr val="B4B4B4"/>
+                </a:solidFill>
+                <a:highlight>
+                  <a:srgbClr val="1E1E1E"/>
+                </a:highlight>
+                <a:latin typeface="Consolas" panose="020B0609020204030204" pitchFamily="49" charset="0"/>
+              </a:rPr>
+              <a:t>||</a:t>
+            </a:r>
+            <a:r>
+              <a:rPr lang="en-US" dirty="0">
+                <a:solidFill>
+                  <a:srgbClr val="DCDCDC"/>
+                </a:solidFill>
+                <a:highlight>
+                  <a:srgbClr val="1E1E1E"/>
+                </a:highlight>
+                <a:latin typeface="Consolas" panose="020B0609020204030204" pitchFamily="49" charset="0"/>
+              </a:rPr>
+              <a:t> </a:t>
+            </a:r>
+            <a:r>
+              <a:rPr lang="en-US" dirty="0" err="1">
+                <a:solidFill>
+                  <a:srgbClr val="DCDCDC"/>
+                </a:solidFill>
+                <a:highlight>
+                  <a:srgbClr val="1E1E1E"/>
+                </a:highlight>
+                <a:latin typeface="Consolas" panose="020B0609020204030204" pitchFamily="49" charset="0"/>
+              </a:rPr>
+              <a:t>i</a:t>
+            </a:r>
+            <a:r>
+              <a:rPr lang="en-US" dirty="0" err="1">
+                <a:solidFill>
+                  <a:srgbClr val="B4B4B4"/>
+                </a:solidFill>
+                <a:highlight>
+                  <a:srgbClr val="1E1E1E"/>
+                </a:highlight>
+                <a:latin typeface="Consolas" panose="020B0609020204030204" pitchFamily="49" charset="0"/>
+              </a:rPr>
+              <a:t>.</a:t>
+            </a:r>
+            <a:r>
+              <a:rPr lang="en-US" dirty="0" err="1">
+                <a:solidFill>
+                  <a:srgbClr val="DCDCDC"/>
+                </a:solidFill>
+                <a:highlight>
+                  <a:srgbClr val="1E1E1E"/>
+                </a:highlight>
+                <a:latin typeface="Consolas" panose="020B0609020204030204" pitchFamily="49" charset="0"/>
+              </a:rPr>
+              <a:t>AlwaysDraw</a:t>
+            </a:r>
+            <a:r>
+              <a:rPr lang="en-US" dirty="0">
+                <a:solidFill>
+                  <a:srgbClr val="DCDCDC"/>
+                </a:solidFill>
+                <a:highlight>
+                  <a:srgbClr val="1E1E1E"/>
+                </a:highlight>
+                <a:latin typeface="Consolas" panose="020B0609020204030204" pitchFamily="49" charset="0"/>
+              </a:rPr>
+              <a:t>))</a:t>
+            </a:r>
+          </a:p>
+          <a:p>
+            <a:r>
+              <a:rPr lang="en-US" dirty="0" smtClean="0">
+                <a:solidFill>
+                  <a:srgbClr val="DCDCDC"/>
+                </a:solidFill>
+                <a:highlight>
+                  <a:srgbClr val="1E1E1E"/>
+                </a:highlight>
+                <a:latin typeface="Consolas" panose="020B0609020204030204" pitchFamily="49" charset="0"/>
+              </a:rPr>
+              <a:t> </a:t>
+            </a:r>
+            <a:r>
+              <a:rPr lang="en-US" dirty="0" smtClean="0">
+                <a:solidFill>
+                  <a:srgbClr val="B4B4B4"/>
+                </a:solidFill>
+                <a:highlight>
+                  <a:srgbClr val="1E1E1E"/>
+                </a:highlight>
+                <a:latin typeface="Consolas" panose="020B0609020204030204" pitchFamily="49" charset="0"/>
+              </a:rPr>
+              <a:t>.</a:t>
+            </a:r>
+            <a:r>
+              <a:rPr lang="en-US" dirty="0" err="1">
+                <a:solidFill>
+                  <a:srgbClr val="DCDCDC"/>
+                </a:solidFill>
+                <a:highlight>
+                  <a:srgbClr val="1E1E1E"/>
+                </a:highlight>
+                <a:latin typeface="Consolas" panose="020B0609020204030204" pitchFamily="49" charset="0"/>
+              </a:rPr>
+              <a:t>OrderBy</a:t>
+            </a:r>
+            <a:r>
+              <a:rPr lang="en-US" dirty="0">
+                <a:solidFill>
+                  <a:srgbClr val="DCDCDC"/>
+                </a:solidFill>
+                <a:highlight>
+                  <a:srgbClr val="1E1E1E"/>
+                </a:highlight>
+                <a:latin typeface="Consolas" panose="020B0609020204030204" pitchFamily="49" charset="0"/>
+              </a:rPr>
+              <a:t>(</a:t>
+            </a:r>
+            <a:r>
+              <a:rPr lang="en-US" dirty="0" err="1">
+                <a:solidFill>
+                  <a:srgbClr val="DCDCDC"/>
+                </a:solidFill>
+                <a:highlight>
+                  <a:srgbClr val="1E1E1E"/>
+                </a:highlight>
+                <a:latin typeface="Consolas" panose="020B0609020204030204" pitchFamily="49" charset="0"/>
+              </a:rPr>
+              <a:t>i</a:t>
+            </a:r>
+            <a:r>
+              <a:rPr lang="en-US" dirty="0">
+                <a:solidFill>
+                  <a:srgbClr val="DCDCDC"/>
+                </a:solidFill>
+                <a:highlight>
+                  <a:srgbClr val="1E1E1E"/>
+                </a:highlight>
+                <a:latin typeface="Consolas" panose="020B0609020204030204" pitchFamily="49" charset="0"/>
+              </a:rPr>
+              <a:t> </a:t>
+            </a:r>
+            <a:r>
+              <a:rPr lang="en-US" dirty="0">
+                <a:solidFill>
+                  <a:srgbClr val="B4B4B4"/>
+                </a:solidFill>
+                <a:highlight>
+                  <a:srgbClr val="1E1E1E"/>
+                </a:highlight>
+                <a:latin typeface="Consolas" panose="020B0609020204030204" pitchFamily="49" charset="0"/>
+              </a:rPr>
+              <a:t>=&gt;</a:t>
+            </a:r>
+            <a:r>
+              <a:rPr lang="en-US" dirty="0">
+                <a:solidFill>
+                  <a:srgbClr val="DCDCDC"/>
+                </a:solidFill>
+                <a:highlight>
+                  <a:srgbClr val="1E1E1E"/>
+                </a:highlight>
+                <a:latin typeface="Consolas" panose="020B0609020204030204" pitchFamily="49" charset="0"/>
+              </a:rPr>
+              <a:t> </a:t>
+            </a:r>
+            <a:r>
+              <a:rPr lang="en-US" dirty="0" err="1">
+                <a:solidFill>
+                  <a:srgbClr val="DCDCDC"/>
+                </a:solidFill>
+                <a:highlight>
+                  <a:srgbClr val="1E1E1E"/>
+                </a:highlight>
+                <a:latin typeface="Consolas" panose="020B0609020204030204" pitchFamily="49" charset="0"/>
+              </a:rPr>
+              <a:t>i</a:t>
+            </a:r>
+            <a:r>
+              <a:rPr lang="en-US" dirty="0">
+                <a:solidFill>
+                  <a:srgbClr val="DCDCDC"/>
+                </a:solidFill>
+                <a:highlight>
+                  <a:srgbClr val="1E1E1E"/>
+                </a:highlight>
+                <a:latin typeface="Consolas" panose="020B0609020204030204" pitchFamily="49" charset="0"/>
+              </a:rPr>
+              <a:t> </a:t>
+            </a:r>
+            <a:r>
+              <a:rPr lang="en-US" dirty="0">
+                <a:solidFill>
+                  <a:srgbClr val="569CD6"/>
+                </a:solidFill>
+                <a:highlight>
+                  <a:srgbClr val="1E1E1E"/>
+                </a:highlight>
+                <a:latin typeface="Consolas" panose="020B0609020204030204" pitchFamily="49" charset="0"/>
+              </a:rPr>
+              <a:t>is</a:t>
+            </a:r>
+            <a:r>
+              <a:rPr lang="en-US" dirty="0">
+                <a:solidFill>
+                  <a:srgbClr val="DCDCDC"/>
+                </a:solidFill>
+                <a:highlight>
+                  <a:srgbClr val="1E1E1E"/>
+                </a:highlight>
+                <a:latin typeface="Consolas" panose="020B0609020204030204" pitchFamily="49" charset="0"/>
+              </a:rPr>
+              <a:t> </a:t>
+            </a:r>
+            <a:r>
+              <a:rPr lang="en-US" dirty="0">
+                <a:solidFill>
+                  <a:srgbClr val="4EC9B0"/>
+                </a:solidFill>
+                <a:highlight>
+                  <a:srgbClr val="1E1E1E"/>
+                </a:highlight>
+                <a:latin typeface="Consolas" panose="020B0609020204030204" pitchFamily="49" charset="0"/>
+              </a:rPr>
+              <a:t>Player</a:t>
+            </a:r>
+            <a:r>
+              <a:rPr lang="en-US" dirty="0">
+                <a:solidFill>
+                  <a:srgbClr val="DCDCDC"/>
+                </a:solidFill>
+                <a:highlight>
+                  <a:srgbClr val="1E1E1E"/>
+                </a:highlight>
+                <a:latin typeface="Consolas" panose="020B0609020204030204" pitchFamily="49" charset="0"/>
+              </a:rPr>
+              <a:t>)</a:t>
+            </a:r>
+          </a:p>
+          <a:p>
+            <a:r>
+              <a:rPr lang="en-US" dirty="0" smtClean="0">
+                <a:solidFill>
+                  <a:srgbClr val="DCDCDC"/>
+                </a:solidFill>
+                <a:highlight>
+                  <a:srgbClr val="1E1E1E"/>
+                </a:highlight>
+                <a:latin typeface="Consolas" panose="020B0609020204030204" pitchFamily="49" charset="0"/>
+              </a:rPr>
+              <a:t> </a:t>
+            </a:r>
+            <a:r>
+              <a:rPr lang="en-US" dirty="0" smtClean="0">
+                <a:solidFill>
+                  <a:srgbClr val="B4B4B4"/>
+                </a:solidFill>
+                <a:highlight>
+                  <a:srgbClr val="1E1E1E"/>
+                </a:highlight>
+                <a:latin typeface="Consolas" panose="020B0609020204030204" pitchFamily="49" charset="0"/>
+              </a:rPr>
+              <a:t>.</a:t>
+            </a:r>
+            <a:r>
+              <a:rPr lang="en-US" dirty="0" err="1">
+                <a:solidFill>
+                  <a:srgbClr val="DCDCDC"/>
+                </a:solidFill>
+                <a:highlight>
+                  <a:srgbClr val="1E1E1E"/>
+                </a:highlight>
+                <a:latin typeface="Consolas" panose="020B0609020204030204" pitchFamily="49" charset="0"/>
+              </a:rPr>
+              <a:t>ThenBy</a:t>
+            </a:r>
+            <a:r>
+              <a:rPr lang="en-US" dirty="0">
+                <a:solidFill>
+                  <a:srgbClr val="DCDCDC"/>
+                </a:solidFill>
+                <a:highlight>
+                  <a:srgbClr val="1E1E1E"/>
+                </a:highlight>
+                <a:latin typeface="Consolas" panose="020B0609020204030204" pitchFamily="49" charset="0"/>
+              </a:rPr>
+              <a:t>(</a:t>
+            </a:r>
+            <a:r>
+              <a:rPr lang="en-US" dirty="0" err="1">
+                <a:solidFill>
+                  <a:srgbClr val="DCDCDC"/>
+                </a:solidFill>
+                <a:highlight>
+                  <a:srgbClr val="1E1E1E"/>
+                </a:highlight>
+                <a:latin typeface="Consolas" panose="020B0609020204030204" pitchFamily="49" charset="0"/>
+              </a:rPr>
+              <a:t>i</a:t>
+            </a:r>
+            <a:r>
+              <a:rPr lang="en-US" dirty="0">
+                <a:solidFill>
+                  <a:srgbClr val="DCDCDC"/>
+                </a:solidFill>
+                <a:highlight>
+                  <a:srgbClr val="1E1E1E"/>
+                </a:highlight>
+                <a:latin typeface="Consolas" panose="020B0609020204030204" pitchFamily="49" charset="0"/>
+              </a:rPr>
+              <a:t> </a:t>
+            </a:r>
+            <a:r>
+              <a:rPr lang="en-US" dirty="0">
+                <a:solidFill>
+                  <a:srgbClr val="B4B4B4"/>
+                </a:solidFill>
+                <a:highlight>
+                  <a:srgbClr val="1E1E1E"/>
+                </a:highlight>
+                <a:latin typeface="Consolas" panose="020B0609020204030204" pitchFamily="49" charset="0"/>
+              </a:rPr>
+              <a:t>=&gt;</a:t>
+            </a:r>
+            <a:r>
+              <a:rPr lang="en-US" dirty="0">
+                <a:solidFill>
+                  <a:srgbClr val="DCDCDC"/>
+                </a:solidFill>
+                <a:highlight>
+                  <a:srgbClr val="1E1E1E"/>
+                </a:highlight>
+                <a:latin typeface="Consolas" panose="020B0609020204030204" pitchFamily="49" charset="0"/>
+              </a:rPr>
+              <a:t> </a:t>
+            </a:r>
+            <a:r>
+              <a:rPr lang="en-US" dirty="0" err="1">
+                <a:solidFill>
+                  <a:srgbClr val="DCDCDC"/>
+                </a:solidFill>
+                <a:highlight>
+                  <a:srgbClr val="1E1E1E"/>
+                </a:highlight>
+                <a:latin typeface="Consolas" panose="020B0609020204030204" pitchFamily="49" charset="0"/>
+              </a:rPr>
+              <a:t>i</a:t>
+            </a:r>
+            <a:r>
+              <a:rPr lang="en-US" dirty="0">
+                <a:solidFill>
+                  <a:srgbClr val="DCDCDC"/>
+                </a:solidFill>
+                <a:highlight>
+                  <a:srgbClr val="1E1E1E"/>
+                </a:highlight>
+                <a:latin typeface="Consolas" panose="020B0609020204030204" pitchFamily="49" charset="0"/>
+              </a:rPr>
+              <a:t> </a:t>
+            </a:r>
+            <a:r>
+              <a:rPr lang="en-US" dirty="0">
+                <a:solidFill>
+                  <a:srgbClr val="569CD6"/>
+                </a:solidFill>
+                <a:highlight>
+                  <a:srgbClr val="1E1E1E"/>
+                </a:highlight>
+                <a:latin typeface="Consolas" panose="020B0609020204030204" pitchFamily="49" charset="0"/>
+              </a:rPr>
+              <a:t>is</a:t>
+            </a:r>
+            <a:r>
+              <a:rPr lang="en-US" dirty="0">
+                <a:solidFill>
+                  <a:srgbClr val="DCDCDC"/>
+                </a:solidFill>
+                <a:highlight>
+                  <a:srgbClr val="1E1E1E"/>
+                </a:highlight>
+                <a:latin typeface="Consolas" panose="020B0609020204030204" pitchFamily="49" charset="0"/>
+              </a:rPr>
+              <a:t> </a:t>
+            </a:r>
+            <a:r>
+              <a:rPr lang="en-US" dirty="0">
+                <a:solidFill>
+                  <a:srgbClr val="4EC9B0"/>
+                </a:solidFill>
+                <a:highlight>
+                  <a:srgbClr val="1E1E1E"/>
+                </a:highlight>
+                <a:latin typeface="Consolas" panose="020B0609020204030204" pitchFamily="49" charset="0"/>
+              </a:rPr>
+              <a:t>Enemy</a:t>
+            </a:r>
+            <a:r>
+              <a:rPr lang="en-US" dirty="0">
+                <a:solidFill>
+                  <a:srgbClr val="DCDCDC"/>
+                </a:solidFill>
+                <a:highlight>
+                  <a:srgbClr val="1E1E1E"/>
+                </a:highlight>
+                <a:latin typeface="Consolas" panose="020B0609020204030204" pitchFamily="49" charset="0"/>
+              </a:rPr>
+              <a:t>)</a:t>
+            </a:r>
+          </a:p>
+          <a:p>
+            <a:r>
+              <a:rPr lang="en-US" dirty="0" smtClean="0">
+                <a:solidFill>
+                  <a:srgbClr val="DCDCDC"/>
+                </a:solidFill>
+                <a:highlight>
+                  <a:srgbClr val="1E1E1E"/>
+                </a:highlight>
+                <a:latin typeface="Consolas" panose="020B0609020204030204" pitchFamily="49" charset="0"/>
+              </a:rPr>
+              <a:t> </a:t>
+            </a:r>
+            <a:r>
+              <a:rPr lang="en-US" dirty="0" smtClean="0">
+                <a:solidFill>
+                  <a:srgbClr val="B4B4B4"/>
+                </a:solidFill>
+                <a:highlight>
+                  <a:srgbClr val="1E1E1E"/>
+                </a:highlight>
+                <a:latin typeface="Consolas" panose="020B0609020204030204" pitchFamily="49" charset="0"/>
+              </a:rPr>
+              <a:t>.</a:t>
+            </a:r>
+            <a:r>
+              <a:rPr lang="en-US" dirty="0" err="1">
+                <a:solidFill>
+                  <a:srgbClr val="DCDCDC"/>
+                </a:solidFill>
+                <a:highlight>
+                  <a:srgbClr val="1E1E1E"/>
+                </a:highlight>
+                <a:latin typeface="Consolas" panose="020B0609020204030204" pitchFamily="49" charset="0"/>
+              </a:rPr>
+              <a:t>ThenBy</a:t>
+            </a:r>
+            <a:r>
+              <a:rPr lang="en-US" dirty="0">
+                <a:solidFill>
+                  <a:srgbClr val="DCDCDC"/>
+                </a:solidFill>
+                <a:highlight>
+                  <a:srgbClr val="1E1E1E"/>
+                </a:highlight>
+                <a:latin typeface="Consolas" panose="020B0609020204030204" pitchFamily="49" charset="0"/>
+              </a:rPr>
+              <a:t>(</a:t>
+            </a:r>
+            <a:r>
+              <a:rPr lang="en-US" dirty="0" err="1">
+                <a:solidFill>
+                  <a:srgbClr val="DCDCDC"/>
+                </a:solidFill>
+                <a:highlight>
+                  <a:srgbClr val="1E1E1E"/>
+                </a:highlight>
+                <a:latin typeface="Consolas" panose="020B0609020204030204" pitchFamily="49" charset="0"/>
+              </a:rPr>
+              <a:t>i</a:t>
+            </a:r>
+            <a:r>
+              <a:rPr lang="en-US" dirty="0">
+                <a:solidFill>
+                  <a:srgbClr val="DCDCDC"/>
+                </a:solidFill>
+                <a:highlight>
+                  <a:srgbClr val="1E1E1E"/>
+                </a:highlight>
+                <a:latin typeface="Consolas" panose="020B0609020204030204" pitchFamily="49" charset="0"/>
+              </a:rPr>
+              <a:t> </a:t>
+            </a:r>
+            <a:r>
+              <a:rPr lang="en-US" dirty="0">
+                <a:solidFill>
+                  <a:srgbClr val="B4B4B4"/>
+                </a:solidFill>
+                <a:highlight>
+                  <a:srgbClr val="1E1E1E"/>
+                </a:highlight>
+                <a:latin typeface="Consolas" panose="020B0609020204030204" pitchFamily="49" charset="0"/>
+              </a:rPr>
+              <a:t>=&gt;</a:t>
+            </a:r>
+            <a:r>
+              <a:rPr lang="en-US" dirty="0">
+                <a:solidFill>
+                  <a:srgbClr val="DCDCDC"/>
+                </a:solidFill>
+                <a:highlight>
+                  <a:srgbClr val="1E1E1E"/>
+                </a:highlight>
+                <a:latin typeface="Consolas" panose="020B0609020204030204" pitchFamily="49" charset="0"/>
+              </a:rPr>
+              <a:t> </a:t>
+            </a:r>
+            <a:r>
+              <a:rPr lang="en-US" dirty="0" err="1">
+                <a:solidFill>
+                  <a:srgbClr val="DCDCDC"/>
+                </a:solidFill>
+                <a:highlight>
+                  <a:srgbClr val="1E1E1E"/>
+                </a:highlight>
+                <a:latin typeface="Consolas" panose="020B0609020204030204" pitchFamily="49" charset="0"/>
+              </a:rPr>
+              <a:t>i</a:t>
+            </a:r>
+            <a:r>
+              <a:rPr lang="en-US" dirty="0">
+                <a:solidFill>
+                  <a:srgbClr val="DCDCDC"/>
+                </a:solidFill>
+                <a:highlight>
+                  <a:srgbClr val="1E1E1E"/>
+                </a:highlight>
+                <a:latin typeface="Consolas" panose="020B0609020204030204" pitchFamily="49" charset="0"/>
+              </a:rPr>
+              <a:t> </a:t>
+            </a:r>
+            <a:r>
+              <a:rPr lang="en-US" dirty="0">
+                <a:solidFill>
+                  <a:srgbClr val="569CD6"/>
+                </a:solidFill>
+                <a:highlight>
+                  <a:srgbClr val="1E1E1E"/>
+                </a:highlight>
+                <a:latin typeface="Consolas" panose="020B0609020204030204" pitchFamily="49" charset="0"/>
+              </a:rPr>
+              <a:t>is</a:t>
+            </a:r>
+            <a:r>
+              <a:rPr lang="en-US" dirty="0">
+                <a:solidFill>
+                  <a:srgbClr val="DCDCDC"/>
+                </a:solidFill>
+                <a:highlight>
+                  <a:srgbClr val="1E1E1E"/>
+                </a:highlight>
+                <a:latin typeface="Consolas" panose="020B0609020204030204" pitchFamily="49" charset="0"/>
+              </a:rPr>
+              <a:t> </a:t>
+            </a:r>
+            <a:r>
+              <a:rPr lang="en-US" dirty="0">
+                <a:solidFill>
+                  <a:srgbClr val="4EC9B0"/>
+                </a:solidFill>
+                <a:highlight>
+                  <a:srgbClr val="1E1E1E"/>
+                </a:highlight>
+                <a:latin typeface="Consolas" panose="020B0609020204030204" pitchFamily="49" charset="0"/>
+              </a:rPr>
+              <a:t>Door</a:t>
+            </a:r>
+            <a:r>
+              <a:rPr lang="en-US" dirty="0">
+                <a:solidFill>
+                  <a:srgbClr val="DCDCDC"/>
+                </a:solidFill>
+                <a:highlight>
+                  <a:srgbClr val="1E1E1E"/>
+                </a:highlight>
+                <a:latin typeface="Consolas" panose="020B0609020204030204" pitchFamily="49" charset="0"/>
+              </a:rPr>
+              <a:t>)</a:t>
+            </a:r>
+          </a:p>
+          <a:p>
+            <a:r>
+              <a:rPr lang="en-US" dirty="0" smtClean="0">
+                <a:solidFill>
+                  <a:srgbClr val="DCDCDC"/>
+                </a:solidFill>
+                <a:highlight>
+                  <a:srgbClr val="1E1E1E"/>
+                </a:highlight>
+                <a:latin typeface="Consolas" panose="020B0609020204030204" pitchFamily="49" charset="0"/>
+              </a:rPr>
+              <a:t> </a:t>
+            </a:r>
+            <a:r>
+              <a:rPr lang="en-US" dirty="0" smtClean="0">
+                <a:solidFill>
+                  <a:srgbClr val="B4B4B4"/>
+                </a:solidFill>
+                <a:highlight>
+                  <a:srgbClr val="1E1E1E"/>
+                </a:highlight>
+                <a:latin typeface="Consolas" panose="020B0609020204030204" pitchFamily="49" charset="0"/>
+              </a:rPr>
+              <a:t>.</a:t>
+            </a:r>
+            <a:r>
+              <a:rPr lang="en-US" dirty="0" err="1">
+                <a:solidFill>
+                  <a:srgbClr val="DCDCDC"/>
+                </a:solidFill>
+                <a:highlight>
+                  <a:srgbClr val="1E1E1E"/>
+                </a:highlight>
+                <a:latin typeface="Consolas" panose="020B0609020204030204" pitchFamily="49" charset="0"/>
+              </a:rPr>
+              <a:t>ThenBy</a:t>
+            </a:r>
+            <a:r>
+              <a:rPr lang="en-US" dirty="0">
+                <a:solidFill>
+                  <a:srgbClr val="DCDCDC"/>
+                </a:solidFill>
+                <a:highlight>
+                  <a:srgbClr val="1E1E1E"/>
+                </a:highlight>
+                <a:latin typeface="Consolas" panose="020B0609020204030204" pitchFamily="49" charset="0"/>
+              </a:rPr>
+              <a:t>(</a:t>
+            </a:r>
+            <a:r>
+              <a:rPr lang="en-US" dirty="0" err="1">
+                <a:solidFill>
+                  <a:srgbClr val="DCDCDC"/>
+                </a:solidFill>
+                <a:highlight>
+                  <a:srgbClr val="1E1E1E"/>
+                </a:highlight>
+                <a:latin typeface="Consolas" panose="020B0609020204030204" pitchFamily="49" charset="0"/>
+              </a:rPr>
+              <a:t>i</a:t>
+            </a:r>
+            <a:r>
+              <a:rPr lang="en-US" dirty="0">
+                <a:solidFill>
+                  <a:srgbClr val="DCDCDC"/>
+                </a:solidFill>
+                <a:highlight>
+                  <a:srgbClr val="1E1E1E"/>
+                </a:highlight>
+                <a:latin typeface="Consolas" panose="020B0609020204030204" pitchFamily="49" charset="0"/>
+              </a:rPr>
+              <a:t> </a:t>
+            </a:r>
+            <a:r>
+              <a:rPr lang="en-US" dirty="0">
+                <a:solidFill>
+                  <a:srgbClr val="B4B4B4"/>
+                </a:solidFill>
+                <a:highlight>
+                  <a:srgbClr val="1E1E1E"/>
+                </a:highlight>
+                <a:latin typeface="Consolas" panose="020B0609020204030204" pitchFamily="49" charset="0"/>
+              </a:rPr>
+              <a:t>=&gt;</a:t>
+            </a:r>
+            <a:r>
+              <a:rPr lang="en-US" dirty="0">
+                <a:solidFill>
+                  <a:srgbClr val="DCDCDC"/>
+                </a:solidFill>
+                <a:highlight>
+                  <a:srgbClr val="1E1E1E"/>
+                </a:highlight>
+                <a:latin typeface="Consolas" panose="020B0609020204030204" pitchFamily="49" charset="0"/>
+              </a:rPr>
+              <a:t> </a:t>
+            </a:r>
+            <a:r>
+              <a:rPr lang="en-US" dirty="0" err="1">
+                <a:solidFill>
+                  <a:srgbClr val="DCDCDC"/>
+                </a:solidFill>
+                <a:highlight>
+                  <a:srgbClr val="1E1E1E"/>
+                </a:highlight>
+                <a:latin typeface="Consolas" panose="020B0609020204030204" pitchFamily="49" charset="0"/>
+              </a:rPr>
+              <a:t>i</a:t>
+            </a:r>
+            <a:r>
+              <a:rPr lang="en-US" dirty="0">
+                <a:solidFill>
+                  <a:srgbClr val="DCDCDC"/>
+                </a:solidFill>
+                <a:highlight>
+                  <a:srgbClr val="1E1E1E"/>
+                </a:highlight>
+                <a:latin typeface="Consolas" panose="020B0609020204030204" pitchFamily="49" charset="0"/>
+              </a:rPr>
+              <a:t> </a:t>
+            </a:r>
+            <a:r>
+              <a:rPr lang="en-US" dirty="0">
+                <a:solidFill>
+                  <a:srgbClr val="569CD6"/>
+                </a:solidFill>
+                <a:highlight>
+                  <a:srgbClr val="1E1E1E"/>
+                </a:highlight>
+                <a:latin typeface="Consolas" panose="020B0609020204030204" pitchFamily="49" charset="0"/>
+              </a:rPr>
+              <a:t>is</a:t>
+            </a:r>
+            <a:r>
+              <a:rPr lang="en-US" dirty="0">
+                <a:solidFill>
+                  <a:srgbClr val="DCDCDC"/>
+                </a:solidFill>
+                <a:highlight>
+                  <a:srgbClr val="1E1E1E"/>
+                </a:highlight>
+                <a:latin typeface="Consolas" panose="020B0609020204030204" pitchFamily="49" charset="0"/>
+              </a:rPr>
+              <a:t> </a:t>
+            </a:r>
+            <a:r>
+              <a:rPr lang="en-US" dirty="0" err="1">
+                <a:solidFill>
+                  <a:srgbClr val="4EC9B0"/>
+                </a:solidFill>
+                <a:highlight>
+                  <a:srgbClr val="1E1E1E"/>
+                </a:highlight>
+                <a:latin typeface="Consolas" panose="020B0609020204030204" pitchFamily="49" charset="0"/>
+              </a:rPr>
+              <a:t>PlayerLife</a:t>
+            </a:r>
+            <a:r>
+              <a:rPr lang="en-US" dirty="0">
+                <a:solidFill>
+                  <a:srgbClr val="DCDCDC"/>
+                </a:solidFill>
+                <a:highlight>
+                  <a:srgbClr val="1E1E1E"/>
+                </a:highlight>
+                <a:latin typeface="Consolas" panose="020B0609020204030204" pitchFamily="49" charset="0"/>
+              </a:rPr>
+              <a:t>)</a:t>
+            </a:r>
+          </a:p>
+          <a:p>
+            <a:r>
+              <a:rPr lang="en-US" dirty="0" smtClean="0">
+                <a:solidFill>
+                  <a:srgbClr val="DCDCDC"/>
+                </a:solidFill>
+                <a:highlight>
+                  <a:srgbClr val="1E1E1E"/>
+                </a:highlight>
+                <a:latin typeface="Consolas" panose="020B0609020204030204" pitchFamily="49" charset="0"/>
+              </a:rPr>
+              <a:t> </a:t>
+            </a:r>
+            <a:r>
+              <a:rPr lang="en-US" dirty="0" smtClean="0">
+                <a:solidFill>
+                  <a:srgbClr val="B4B4B4"/>
+                </a:solidFill>
+                <a:highlight>
+                  <a:srgbClr val="1E1E1E"/>
+                </a:highlight>
+                <a:latin typeface="Consolas" panose="020B0609020204030204" pitchFamily="49" charset="0"/>
+              </a:rPr>
+              <a:t>.</a:t>
+            </a:r>
+            <a:r>
+              <a:rPr lang="en-US" dirty="0" err="1">
+                <a:solidFill>
+                  <a:srgbClr val="DCDCDC"/>
+                </a:solidFill>
+                <a:highlight>
+                  <a:srgbClr val="1E1E1E"/>
+                </a:highlight>
+                <a:latin typeface="Consolas" panose="020B0609020204030204" pitchFamily="49" charset="0"/>
+              </a:rPr>
+              <a:t>ThenBy</a:t>
+            </a:r>
+            <a:r>
+              <a:rPr lang="en-US" dirty="0">
+                <a:solidFill>
+                  <a:srgbClr val="DCDCDC"/>
+                </a:solidFill>
+                <a:highlight>
+                  <a:srgbClr val="1E1E1E"/>
+                </a:highlight>
+                <a:latin typeface="Consolas" panose="020B0609020204030204" pitchFamily="49" charset="0"/>
+              </a:rPr>
+              <a:t>(</a:t>
+            </a:r>
+            <a:r>
+              <a:rPr lang="en-US" dirty="0" err="1">
+                <a:solidFill>
+                  <a:srgbClr val="DCDCDC"/>
+                </a:solidFill>
+                <a:highlight>
+                  <a:srgbClr val="1E1E1E"/>
+                </a:highlight>
+                <a:latin typeface="Consolas" panose="020B0609020204030204" pitchFamily="49" charset="0"/>
+              </a:rPr>
+              <a:t>i</a:t>
+            </a:r>
+            <a:r>
+              <a:rPr lang="en-US" dirty="0">
+                <a:solidFill>
+                  <a:srgbClr val="DCDCDC"/>
+                </a:solidFill>
+                <a:highlight>
+                  <a:srgbClr val="1E1E1E"/>
+                </a:highlight>
+                <a:latin typeface="Consolas" panose="020B0609020204030204" pitchFamily="49" charset="0"/>
+              </a:rPr>
+              <a:t> </a:t>
+            </a:r>
+            <a:r>
+              <a:rPr lang="en-US" dirty="0">
+                <a:solidFill>
+                  <a:srgbClr val="B4B4B4"/>
+                </a:solidFill>
+                <a:highlight>
+                  <a:srgbClr val="1E1E1E"/>
+                </a:highlight>
+                <a:latin typeface="Consolas" panose="020B0609020204030204" pitchFamily="49" charset="0"/>
+              </a:rPr>
+              <a:t>=&gt;</a:t>
+            </a:r>
+            <a:r>
+              <a:rPr lang="en-US" dirty="0">
+                <a:solidFill>
+                  <a:srgbClr val="DCDCDC"/>
+                </a:solidFill>
+                <a:highlight>
+                  <a:srgbClr val="1E1E1E"/>
+                </a:highlight>
+                <a:latin typeface="Consolas" panose="020B0609020204030204" pitchFamily="49" charset="0"/>
+              </a:rPr>
+              <a:t> </a:t>
+            </a:r>
+            <a:r>
+              <a:rPr lang="en-US" dirty="0" err="1">
+                <a:solidFill>
+                  <a:srgbClr val="DCDCDC"/>
+                </a:solidFill>
+                <a:highlight>
+                  <a:srgbClr val="1E1E1E"/>
+                </a:highlight>
+                <a:latin typeface="Consolas" panose="020B0609020204030204" pitchFamily="49" charset="0"/>
+              </a:rPr>
+              <a:t>i</a:t>
+            </a:r>
+            <a:r>
+              <a:rPr lang="en-US" dirty="0">
+                <a:solidFill>
+                  <a:srgbClr val="DCDCDC"/>
+                </a:solidFill>
+                <a:highlight>
+                  <a:srgbClr val="1E1E1E"/>
+                </a:highlight>
+                <a:latin typeface="Consolas" panose="020B0609020204030204" pitchFamily="49" charset="0"/>
+              </a:rPr>
+              <a:t> </a:t>
+            </a:r>
+            <a:r>
+              <a:rPr lang="en-US" dirty="0">
+                <a:solidFill>
+                  <a:srgbClr val="569CD6"/>
+                </a:solidFill>
+                <a:highlight>
+                  <a:srgbClr val="1E1E1E"/>
+                </a:highlight>
+                <a:latin typeface="Consolas" panose="020B0609020204030204" pitchFamily="49" charset="0"/>
+              </a:rPr>
+              <a:t>is</a:t>
+            </a:r>
+            <a:r>
+              <a:rPr lang="en-US" dirty="0">
+                <a:solidFill>
+                  <a:srgbClr val="DCDCDC"/>
+                </a:solidFill>
+                <a:highlight>
+                  <a:srgbClr val="1E1E1E"/>
+                </a:highlight>
+                <a:latin typeface="Consolas" panose="020B0609020204030204" pitchFamily="49" charset="0"/>
+              </a:rPr>
+              <a:t> </a:t>
+            </a:r>
+            <a:r>
+              <a:rPr lang="en-US" dirty="0">
+                <a:solidFill>
+                  <a:srgbClr val="4EC9B0"/>
+                </a:solidFill>
+                <a:highlight>
+                  <a:srgbClr val="1E1E1E"/>
+                </a:highlight>
+                <a:latin typeface="Consolas" panose="020B0609020204030204" pitchFamily="49" charset="0"/>
+              </a:rPr>
+              <a:t>Tile</a:t>
+            </a:r>
+            <a:r>
+              <a:rPr lang="en-US" dirty="0">
+                <a:solidFill>
+                  <a:srgbClr val="DCDCDC"/>
+                </a:solidFill>
+                <a:highlight>
+                  <a:srgbClr val="1E1E1E"/>
+                </a:highlight>
+                <a:latin typeface="Consolas" panose="020B0609020204030204" pitchFamily="49" charset="0"/>
+              </a:rPr>
+              <a:t>)</a:t>
+            </a:r>
+          </a:p>
+          <a:p>
+            <a:r>
+              <a:rPr lang="en-US" dirty="0" smtClean="0">
+                <a:solidFill>
+                  <a:srgbClr val="DCDCDC"/>
+                </a:solidFill>
+                <a:highlight>
+                  <a:srgbClr val="1E1E1E"/>
+                </a:highlight>
+                <a:latin typeface="Consolas" panose="020B0609020204030204" pitchFamily="49" charset="0"/>
+              </a:rPr>
+              <a:t> </a:t>
+            </a:r>
+            <a:r>
+              <a:rPr lang="en-US" dirty="0" smtClean="0">
+                <a:solidFill>
+                  <a:srgbClr val="B4B4B4"/>
+                </a:solidFill>
+                <a:highlight>
+                  <a:srgbClr val="1E1E1E"/>
+                </a:highlight>
+                <a:latin typeface="Consolas" panose="020B0609020204030204" pitchFamily="49" charset="0"/>
+              </a:rPr>
+              <a:t>.</a:t>
+            </a:r>
+            <a:r>
+              <a:rPr lang="en-US" dirty="0" err="1">
+                <a:solidFill>
+                  <a:srgbClr val="DCDCDC"/>
+                </a:solidFill>
+                <a:highlight>
+                  <a:srgbClr val="1E1E1E"/>
+                </a:highlight>
+                <a:latin typeface="Consolas" panose="020B0609020204030204" pitchFamily="49" charset="0"/>
+              </a:rPr>
+              <a:t>ThenBy</a:t>
+            </a:r>
+            <a:r>
+              <a:rPr lang="en-US" dirty="0">
+                <a:solidFill>
+                  <a:srgbClr val="DCDCDC"/>
+                </a:solidFill>
+                <a:highlight>
+                  <a:srgbClr val="1E1E1E"/>
+                </a:highlight>
+                <a:latin typeface="Consolas" panose="020B0609020204030204" pitchFamily="49" charset="0"/>
+              </a:rPr>
+              <a:t>(</a:t>
+            </a:r>
+            <a:r>
+              <a:rPr lang="en-US" dirty="0" err="1">
+                <a:solidFill>
+                  <a:srgbClr val="DCDCDC"/>
+                </a:solidFill>
+                <a:highlight>
+                  <a:srgbClr val="1E1E1E"/>
+                </a:highlight>
+                <a:latin typeface="Consolas" panose="020B0609020204030204" pitchFamily="49" charset="0"/>
+              </a:rPr>
+              <a:t>i</a:t>
+            </a:r>
+            <a:r>
+              <a:rPr lang="en-US" dirty="0">
+                <a:solidFill>
+                  <a:srgbClr val="DCDCDC"/>
+                </a:solidFill>
+                <a:highlight>
+                  <a:srgbClr val="1E1E1E"/>
+                </a:highlight>
+                <a:latin typeface="Consolas" panose="020B0609020204030204" pitchFamily="49" charset="0"/>
+              </a:rPr>
+              <a:t> </a:t>
+            </a:r>
+            <a:r>
+              <a:rPr lang="en-US" dirty="0">
+                <a:solidFill>
+                  <a:srgbClr val="B4B4B4"/>
+                </a:solidFill>
+                <a:highlight>
+                  <a:srgbClr val="1E1E1E"/>
+                </a:highlight>
+                <a:latin typeface="Consolas" panose="020B0609020204030204" pitchFamily="49" charset="0"/>
+              </a:rPr>
+              <a:t>=&gt;</a:t>
+            </a:r>
+            <a:r>
+              <a:rPr lang="en-US" dirty="0">
+                <a:solidFill>
+                  <a:srgbClr val="DCDCDC"/>
+                </a:solidFill>
+                <a:highlight>
+                  <a:srgbClr val="1E1E1E"/>
+                </a:highlight>
+                <a:latin typeface="Consolas" panose="020B0609020204030204" pitchFamily="49" charset="0"/>
+              </a:rPr>
+              <a:t> </a:t>
+            </a:r>
+            <a:r>
+              <a:rPr lang="en-US" dirty="0" err="1">
+                <a:solidFill>
+                  <a:srgbClr val="DCDCDC"/>
+                </a:solidFill>
+                <a:highlight>
+                  <a:srgbClr val="1E1E1E"/>
+                </a:highlight>
+                <a:latin typeface="Consolas" panose="020B0609020204030204" pitchFamily="49" charset="0"/>
+              </a:rPr>
+              <a:t>i</a:t>
+            </a:r>
+            <a:r>
+              <a:rPr lang="en-US" dirty="0">
+                <a:solidFill>
+                  <a:srgbClr val="DCDCDC"/>
+                </a:solidFill>
+                <a:highlight>
+                  <a:srgbClr val="1E1E1E"/>
+                </a:highlight>
+                <a:latin typeface="Consolas" panose="020B0609020204030204" pitchFamily="49" charset="0"/>
+              </a:rPr>
+              <a:t> </a:t>
+            </a:r>
+            <a:r>
+              <a:rPr lang="en-US" dirty="0">
+                <a:solidFill>
+                  <a:srgbClr val="569CD6"/>
+                </a:solidFill>
+                <a:highlight>
+                  <a:srgbClr val="1E1E1E"/>
+                </a:highlight>
+                <a:latin typeface="Consolas" panose="020B0609020204030204" pitchFamily="49" charset="0"/>
+              </a:rPr>
+              <a:t>is</a:t>
+            </a:r>
+            <a:r>
+              <a:rPr lang="en-US" dirty="0">
+                <a:solidFill>
+                  <a:srgbClr val="DCDCDC"/>
+                </a:solidFill>
+                <a:highlight>
+                  <a:srgbClr val="1E1E1E"/>
+                </a:highlight>
+                <a:latin typeface="Consolas" panose="020B0609020204030204" pitchFamily="49" charset="0"/>
+              </a:rPr>
+              <a:t> </a:t>
+            </a:r>
+            <a:r>
+              <a:rPr lang="en-US" dirty="0">
+                <a:solidFill>
+                  <a:srgbClr val="4EC9B0"/>
+                </a:solidFill>
+                <a:highlight>
+                  <a:srgbClr val="1E1E1E"/>
+                </a:highlight>
+                <a:latin typeface="Consolas" panose="020B0609020204030204" pitchFamily="49" charset="0"/>
+              </a:rPr>
+              <a:t>Hill</a:t>
+            </a:r>
+            <a:r>
+              <a:rPr lang="en-US" dirty="0">
+                <a:solidFill>
+                  <a:srgbClr val="DCDCDC"/>
+                </a:solidFill>
+                <a:highlight>
+                  <a:srgbClr val="1E1E1E"/>
+                </a:highlight>
+                <a:latin typeface="Consolas" panose="020B0609020204030204" pitchFamily="49" charset="0"/>
+              </a:rPr>
+              <a:t>)</a:t>
+            </a:r>
+          </a:p>
+          <a:p>
+            <a:r>
+              <a:rPr lang="en-US" dirty="0" smtClean="0">
+                <a:solidFill>
+                  <a:srgbClr val="DCDCDC"/>
+                </a:solidFill>
+                <a:highlight>
+                  <a:srgbClr val="1E1E1E"/>
+                </a:highlight>
+                <a:latin typeface="Consolas" panose="020B0609020204030204" pitchFamily="49" charset="0"/>
+              </a:rPr>
+              <a:t> </a:t>
+            </a:r>
+            <a:r>
+              <a:rPr lang="en-US" dirty="0" smtClean="0">
+                <a:solidFill>
+                  <a:srgbClr val="B4B4B4"/>
+                </a:solidFill>
+                <a:highlight>
+                  <a:srgbClr val="1E1E1E"/>
+                </a:highlight>
+                <a:latin typeface="Consolas" panose="020B0609020204030204" pitchFamily="49" charset="0"/>
+              </a:rPr>
+              <a:t>.</a:t>
+            </a:r>
+            <a:r>
+              <a:rPr lang="en-US" dirty="0" err="1">
+                <a:solidFill>
+                  <a:srgbClr val="DCDCDC"/>
+                </a:solidFill>
+                <a:highlight>
+                  <a:srgbClr val="1E1E1E"/>
+                </a:highlight>
+                <a:latin typeface="Consolas" panose="020B0609020204030204" pitchFamily="49" charset="0"/>
+              </a:rPr>
+              <a:t>ThenBy</a:t>
+            </a:r>
+            <a:r>
+              <a:rPr lang="en-US" dirty="0">
+                <a:solidFill>
+                  <a:srgbClr val="DCDCDC"/>
+                </a:solidFill>
+                <a:highlight>
+                  <a:srgbClr val="1E1E1E"/>
+                </a:highlight>
+                <a:latin typeface="Consolas" panose="020B0609020204030204" pitchFamily="49" charset="0"/>
+              </a:rPr>
+              <a:t>(</a:t>
+            </a:r>
+            <a:r>
+              <a:rPr lang="en-US" dirty="0" err="1">
+                <a:solidFill>
+                  <a:srgbClr val="DCDCDC"/>
+                </a:solidFill>
+                <a:highlight>
+                  <a:srgbClr val="1E1E1E"/>
+                </a:highlight>
+                <a:latin typeface="Consolas" panose="020B0609020204030204" pitchFamily="49" charset="0"/>
+              </a:rPr>
+              <a:t>i</a:t>
+            </a:r>
+            <a:r>
+              <a:rPr lang="en-US" dirty="0">
+                <a:solidFill>
+                  <a:srgbClr val="DCDCDC"/>
+                </a:solidFill>
+                <a:highlight>
+                  <a:srgbClr val="1E1E1E"/>
+                </a:highlight>
+                <a:latin typeface="Consolas" panose="020B0609020204030204" pitchFamily="49" charset="0"/>
+              </a:rPr>
+              <a:t> </a:t>
+            </a:r>
+            <a:r>
+              <a:rPr lang="en-US" dirty="0">
+                <a:solidFill>
+                  <a:srgbClr val="B4B4B4"/>
+                </a:solidFill>
+                <a:highlight>
+                  <a:srgbClr val="1E1E1E"/>
+                </a:highlight>
+                <a:latin typeface="Consolas" panose="020B0609020204030204" pitchFamily="49" charset="0"/>
+              </a:rPr>
+              <a:t>=&gt;</a:t>
+            </a:r>
+            <a:r>
+              <a:rPr lang="en-US" dirty="0">
+                <a:solidFill>
+                  <a:srgbClr val="DCDCDC"/>
+                </a:solidFill>
+                <a:highlight>
+                  <a:srgbClr val="1E1E1E"/>
+                </a:highlight>
+                <a:latin typeface="Consolas" panose="020B0609020204030204" pitchFamily="49" charset="0"/>
+              </a:rPr>
+              <a:t> </a:t>
+            </a:r>
+            <a:r>
+              <a:rPr lang="en-US" dirty="0" err="1">
+                <a:solidFill>
+                  <a:srgbClr val="DCDCDC"/>
+                </a:solidFill>
+                <a:highlight>
+                  <a:srgbClr val="1E1E1E"/>
+                </a:highlight>
+                <a:latin typeface="Consolas" panose="020B0609020204030204" pitchFamily="49" charset="0"/>
+              </a:rPr>
+              <a:t>i</a:t>
+            </a:r>
+            <a:r>
+              <a:rPr lang="en-US" dirty="0">
+                <a:solidFill>
+                  <a:srgbClr val="DCDCDC"/>
+                </a:solidFill>
+                <a:highlight>
+                  <a:srgbClr val="1E1E1E"/>
+                </a:highlight>
+                <a:latin typeface="Consolas" panose="020B0609020204030204" pitchFamily="49" charset="0"/>
+              </a:rPr>
+              <a:t> </a:t>
+            </a:r>
+            <a:r>
+              <a:rPr lang="en-US" dirty="0">
+                <a:solidFill>
+                  <a:srgbClr val="569CD6"/>
+                </a:solidFill>
+                <a:highlight>
+                  <a:srgbClr val="1E1E1E"/>
+                </a:highlight>
+                <a:latin typeface="Consolas" panose="020B0609020204030204" pitchFamily="49" charset="0"/>
+              </a:rPr>
+              <a:t>is</a:t>
+            </a:r>
+            <a:r>
+              <a:rPr lang="en-US" dirty="0">
+                <a:solidFill>
+                  <a:srgbClr val="DCDCDC"/>
+                </a:solidFill>
+                <a:highlight>
+                  <a:srgbClr val="1E1E1E"/>
+                </a:highlight>
+                <a:latin typeface="Consolas" panose="020B0609020204030204" pitchFamily="49" charset="0"/>
+              </a:rPr>
+              <a:t> </a:t>
+            </a:r>
+            <a:r>
+              <a:rPr lang="en-US" dirty="0">
+                <a:solidFill>
+                  <a:srgbClr val="4EC9B0"/>
+                </a:solidFill>
+                <a:highlight>
+                  <a:srgbClr val="1E1E1E"/>
+                </a:highlight>
+                <a:latin typeface="Consolas" panose="020B0609020204030204" pitchFamily="49" charset="0"/>
+              </a:rPr>
+              <a:t>Cloud</a:t>
+            </a:r>
+            <a:r>
+              <a:rPr lang="en-US" dirty="0">
+                <a:solidFill>
+                  <a:srgbClr val="DCDCDC"/>
+                </a:solidFill>
+                <a:highlight>
+                  <a:srgbClr val="1E1E1E"/>
+                </a:highlight>
+                <a:latin typeface="Consolas" panose="020B0609020204030204" pitchFamily="49" charset="0"/>
+              </a:rPr>
+              <a:t>)</a:t>
+            </a:r>
+          </a:p>
+          <a:p>
+            <a:r>
+              <a:rPr lang="en-US" dirty="0" smtClean="0">
+                <a:solidFill>
+                  <a:srgbClr val="DCDCDC"/>
+                </a:solidFill>
+                <a:highlight>
+                  <a:srgbClr val="1E1E1E"/>
+                </a:highlight>
+                <a:latin typeface="Consolas" panose="020B0609020204030204" pitchFamily="49" charset="0"/>
+              </a:rPr>
+              <a:t> </a:t>
+            </a:r>
+            <a:r>
+              <a:rPr lang="en-US" dirty="0" smtClean="0">
+                <a:solidFill>
+                  <a:srgbClr val="B4B4B4"/>
+                </a:solidFill>
+                <a:highlight>
+                  <a:srgbClr val="1E1E1E"/>
+                </a:highlight>
+                <a:latin typeface="Consolas" panose="020B0609020204030204" pitchFamily="49" charset="0"/>
+              </a:rPr>
+              <a:t>.</a:t>
+            </a:r>
+            <a:r>
+              <a:rPr lang="en-US" dirty="0" err="1">
+                <a:solidFill>
+                  <a:srgbClr val="DCDCDC"/>
+                </a:solidFill>
+                <a:highlight>
+                  <a:srgbClr val="1E1E1E"/>
+                </a:highlight>
+                <a:latin typeface="Consolas" panose="020B0609020204030204" pitchFamily="49" charset="0"/>
+              </a:rPr>
+              <a:t>ThenBy</a:t>
+            </a:r>
+            <a:r>
+              <a:rPr lang="en-US" dirty="0">
+                <a:solidFill>
+                  <a:srgbClr val="DCDCDC"/>
+                </a:solidFill>
+                <a:highlight>
+                  <a:srgbClr val="1E1E1E"/>
+                </a:highlight>
+                <a:latin typeface="Consolas" panose="020B0609020204030204" pitchFamily="49" charset="0"/>
+              </a:rPr>
+              <a:t>(</a:t>
+            </a:r>
+            <a:r>
+              <a:rPr lang="en-US" dirty="0" err="1">
+                <a:solidFill>
+                  <a:srgbClr val="DCDCDC"/>
+                </a:solidFill>
+                <a:highlight>
+                  <a:srgbClr val="1E1E1E"/>
+                </a:highlight>
+                <a:latin typeface="Consolas" panose="020B0609020204030204" pitchFamily="49" charset="0"/>
+              </a:rPr>
+              <a:t>i</a:t>
+            </a:r>
+            <a:r>
+              <a:rPr lang="en-US" dirty="0">
+                <a:solidFill>
+                  <a:srgbClr val="DCDCDC"/>
+                </a:solidFill>
+                <a:highlight>
+                  <a:srgbClr val="1E1E1E"/>
+                </a:highlight>
+                <a:latin typeface="Consolas" panose="020B0609020204030204" pitchFamily="49" charset="0"/>
+              </a:rPr>
+              <a:t> </a:t>
+            </a:r>
+            <a:r>
+              <a:rPr lang="en-US" dirty="0">
+                <a:solidFill>
+                  <a:srgbClr val="B4B4B4"/>
+                </a:solidFill>
+                <a:highlight>
+                  <a:srgbClr val="1E1E1E"/>
+                </a:highlight>
+                <a:latin typeface="Consolas" panose="020B0609020204030204" pitchFamily="49" charset="0"/>
+              </a:rPr>
+              <a:t>=&gt;</a:t>
+            </a:r>
+            <a:r>
+              <a:rPr lang="en-US" dirty="0">
+                <a:solidFill>
+                  <a:srgbClr val="DCDCDC"/>
+                </a:solidFill>
+                <a:highlight>
+                  <a:srgbClr val="1E1E1E"/>
+                </a:highlight>
+                <a:latin typeface="Consolas" panose="020B0609020204030204" pitchFamily="49" charset="0"/>
+              </a:rPr>
+              <a:t> </a:t>
+            </a:r>
+            <a:r>
+              <a:rPr lang="en-US" dirty="0" err="1">
+                <a:solidFill>
+                  <a:srgbClr val="DCDCDC"/>
+                </a:solidFill>
+                <a:highlight>
+                  <a:srgbClr val="1E1E1E"/>
+                </a:highlight>
+                <a:latin typeface="Consolas" panose="020B0609020204030204" pitchFamily="49" charset="0"/>
+              </a:rPr>
+              <a:t>i</a:t>
+            </a:r>
+            <a:r>
+              <a:rPr lang="en-US" dirty="0">
+                <a:solidFill>
+                  <a:srgbClr val="DCDCDC"/>
+                </a:solidFill>
+                <a:highlight>
+                  <a:srgbClr val="1E1E1E"/>
+                </a:highlight>
+                <a:latin typeface="Consolas" panose="020B0609020204030204" pitchFamily="49" charset="0"/>
+              </a:rPr>
+              <a:t> </a:t>
+            </a:r>
+            <a:r>
+              <a:rPr lang="en-US" dirty="0">
+                <a:solidFill>
+                  <a:srgbClr val="569CD6"/>
+                </a:solidFill>
+                <a:highlight>
+                  <a:srgbClr val="1E1E1E"/>
+                </a:highlight>
+                <a:latin typeface="Consolas" panose="020B0609020204030204" pitchFamily="49" charset="0"/>
+              </a:rPr>
+              <a:t>is</a:t>
+            </a:r>
+            <a:r>
+              <a:rPr lang="en-US" dirty="0">
+                <a:solidFill>
+                  <a:srgbClr val="DCDCDC"/>
+                </a:solidFill>
+                <a:highlight>
+                  <a:srgbClr val="1E1E1E"/>
+                </a:highlight>
+                <a:latin typeface="Consolas" panose="020B0609020204030204" pitchFamily="49" charset="0"/>
+              </a:rPr>
+              <a:t> </a:t>
+            </a:r>
+            <a:r>
+              <a:rPr lang="en-US" dirty="0">
+                <a:solidFill>
+                  <a:srgbClr val="4EC9B0"/>
+                </a:solidFill>
+                <a:highlight>
+                  <a:srgbClr val="1E1E1E"/>
+                </a:highlight>
+                <a:latin typeface="Consolas" panose="020B0609020204030204" pitchFamily="49" charset="0"/>
+              </a:rPr>
+              <a:t>Sun</a:t>
+            </a:r>
+            <a:r>
+              <a:rPr lang="en-US" dirty="0">
+                <a:solidFill>
+                  <a:srgbClr val="DCDCDC"/>
+                </a:solidFill>
+                <a:highlight>
+                  <a:srgbClr val="1E1E1E"/>
+                </a:highlight>
+                <a:latin typeface="Consolas" panose="020B0609020204030204" pitchFamily="49" charset="0"/>
+              </a:rPr>
+              <a:t>)</a:t>
+            </a:r>
+          </a:p>
+          <a:p>
+            <a:r>
+              <a:rPr lang="en-US" dirty="0" smtClean="0">
+                <a:solidFill>
+                  <a:srgbClr val="DCDCDC"/>
+                </a:solidFill>
+                <a:highlight>
+                  <a:srgbClr val="1E1E1E"/>
+                </a:highlight>
+                <a:latin typeface="Consolas" panose="020B0609020204030204" pitchFamily="49" charset="0"/>
+              </a:rPr>
+              <a:t> </a:t>
+            </a:r>
+            <a:r>
+              <a:rPr lang="en-US" dirty="0" smtClean="0">
+                <a:solidFill>
+                  <a:srgbClr val="B4B4B4"/>
+                </a:solidFill>
+                <a:highlight>
+                  <a:srgbClr val="1E1E1E"/>
+                </a:highlight>
+                <a:latin typeface="Consolas" panose="020B0609020204030204" pitchFamily="49" charset="0"/>
+              </a:rPr>
+              <a:t>.</a:t>
+            </a:r>
+            <a:r>
+              <a:rPr lang="en-US" dirty="0" err="1">
+                <a:solidFill>
+                  <a:srgbClr val="DCDCDC"/>
+                </a:solidFill>
+                <a:highlight>
+                  <a:srgbClr val="1E1E1E"/>
+                </a:highlight>
+                <a:latin typeface="Consolas" panose="020B0609020204030204" pitchFamily="49" charset="0"/>
+              </a:rPr>
+              <a:t>ToList</a:t>
+            </a:r>
+            <a:r>
+              <a:rPr lang="en-US" dirty="0">
+                <a:solidFill>
+                  <a:srgbClr val="DCDCDC"/>
+                </a:solidFill>
+                <a:highlight>
+                  <a:srgbClr val="1E1E1E"/>
+                </a:highlight>
+                <a:latin typeface="Consolas" panose="020B0609020204030204" pitchFamily="49" charset="0"/>
+              </a:rPr>
+              <a:t>()</a:t>
+            </a:r>
+            <a:r>
+              <a:rPr lang="en-US" dirty="0">
+                <a:solidFill>
+                  <a:srgbClr val="B4B4B4"/>
+                </a:solidFill>
+                <a:highlight>
+                  <a:srgbClr val="1E1E1E"/>
+                </a:highlight>
+                <a:latin typeface="Consolas" panose="020B0609020204030204" pitchFamily="49" charset="0"/>
+              </a:rPr>
+              <a:t>.</a:t>
+            </a:r>
+            <a:r>
+              <a:rPr lang="en-US" dirty="0" err="1">
+                <a:solidFill>
+                  <a:srgbClr val="DCDCDC"/>
+                </a:solidFill>
+                <a:highlight>
+                  <a:srgbClr val="1E1E1E"/>
+                </a:highlight>
+                <a:latin typeface="Consolas" panose="020B0609020204030204" pitchFamily="49" charset="0"/>
+              </a:rPr>
+              <a:t>ForEach</a:t>
+            </a:r>
+            <a:r>
+              <a:rPr lang="en-US" dirty="0">
+                <a:solidFill>
+                  <a:srgbClr val="DCDCDC"/>
+                </a:solidFill>
+                <a:highlight>
+                  <a:srgbClr val="1E1E1E"/>
+                </a:highlight>
+                <a:latin typeface="Consolas" panose="020B0609020204030204" pitchFamily="49" charset="0"/>
+              </a:rPr>
+              <a:t>(</a:t>
+            </a:r>
+            <a:r>
+              <a:rPr lang="en-US" dirty="0" err="1">
+                <a:solidFill>
+                  <a:srgbClr val="DCDCDC"/>
+                </a:solidFill>
+                <a:highlight>
+                  <a:srgbClr val="1E1E1E"/>
+                </a:highlight>
+                <a:latin typeface="Consolas" panose="020B0609020204030204" pitchFamily="49" charset="0"/>
+              </a:rPr>
+              <a:t>i</a:t>
+            </a:r>
+            <a:r>
+              <a:rPr lang="en-US" dirty="0">
+                <a:solidFill>
+                  <a:srgbClr val="DCDCDC"/>
+                </a:solidFill>
+                <a:highlight>
+                  <a:srgbClr val="1E1E1E"/>
+                </a:highlight>
+                <a:latin typeface="Consolas" panose="020B0609020204030204" pitchFamily="49" charset="0"/>
+              </a:rPr>
+              <a:t> </a:t>
+            </a:r>
+            <a:r>
+              <a:rPr lang="en-US" dirty="0">
+                <a:solidFill>
+                  <a:srgbClr val="B4B4B4"/>
+                </a:solidFill>
+                <a:highlight>
+                  <a:srgbClr val="1E1E1E"/>
+                </a:highlight>
+                <a:latin typeface="Consolas" panose="020B0609020204030204" pitchFamily="49" charset="0"/>
+              </a:rPr>
+              <a:t>=&gt;</a:t>
+            </a:r>
+            <a:endParaRPr lang="en-US" dirty="0">
+              <a:solidFill>
+                <a:srgbClr val="DCDCDC"/>
+              </a:solidFill>
+              <a:highlight>
+                <a:srgbClr val="1E1E1E"/>
+              </a:highlight>
+              <a:latin typeface="Consolas" panose="020B0609020204030204" pitchFamily="49" charset="0"/>
+            </a:endParaRPr>
+          </a:p>
+          <a:p>
+            <a:r>
+              <a:rPr lang="en-US" dirty="0" smtClean="0">
+                <a:solidFill>
+                  <a:srgbClr val="DCDCDC"/>
+                </a:solidFill>
+                <a:highlight>
+                  <a:srgbClr val="1E1E1E"/>
+                </a:highlight>
+                <a:latin typeface="Consolas" panose="020B0609020204030204" pitchFamily="49" charset="0"/>
+              </a:rPr>
+              <a:t> {</a:t>
+            </a:r>
+            <a:endParaRPr lang="en-US" dirty="0">
+              <a:solidFill>
+                <a:srgbClr val="DCDCDC"/>
+              </a:solidFill>
+              <a:highlight>
+                <a:srgbClr val="1E1E1E"/>
+              </a:highlight>
+              <a:latin typeface="Consolas" panose="020B0609020204030204" pitchFamily="49" charset="0"/>
+            </a:endParaRPr>
+          </a:p>
+          <a:p>
+            <a:r>
+              <a:rPr lang="en-US" dirty="0" smtClean="0">
+                <a:solidFill>
+                  <a:srgbClr val="DCDCDC"/>
+                </a:solidFill>
+                <a:highlight>
+                  <a:srgbClr val="1E1E1E"/>
+                </a:highlight>
+                <a:latin typeface="Consolas" panose="020B0609020204030204" pitchFamily="49" charset="0"/>
+              </a:rPr>
+              <a:t>   </a:t>
+            </a:r>
+            <a:r>
+              <a:rPr lang="en-US" dirty="0" err="1" smtClean="0">
+                <a:solidFill>
+                  <a:srgbClr val="DCDCDC"/>
+                </a:solidFill>
+                <a:highlight>
+                  <a:srgbClr val="1E1E1E"/>
+                </a:highlight>
+                <a:latin typeface="Consolas" panose="020B0609020204030204" pitchFamily="49" charset="0"/>
+              </a:rPr>
+              <a:t>i</a:t>
+            </a:r>
+            <a:r>
+              <a:rPr lang="en-US" dirty="0" err="1" smtClean="0">
+                <a:solidFill>
+                  <a:srgbClr val="B4B4B4"/>
+                </a:solidFill>
+                <a:highlight>
+                  <a:srgbClr val="1E1E1E"/>
+                </a:highlight>
+                <a:latin typeface="Consolas" panose="020B0609020204030204" pitchFamily="49" charset="0"/>
+              </a:rPr>
+              <a:t>.</a:t>
+            </a:r>
+            <a:r>
+              <a:rPr lang="en-US" dirty="0" err="1" smtClean="0">
+                <a:solidFill>
+                  <a:srgbClr val="DCDCDC"/>
+                </a:solidFill>
+                <a:highlight>
+                  <a:srgbClr val="1E1E1E"/>
+                </a:highlight>
+                <a:latin typeface="Consolas" panose="020B0609020204030204" pitchFamily="49" charset="0"/>
+              </a:rPr>
+              <a:t>Draw</a:t>
+            </a:r>
+            <a:r>
+              <a:rPr lang="en-US" dirty="0" smtClean="0">
+                <a:solidFill>
+                  <a:srgbClr val="DCDCDC"/>
+                </a:solidFill>
+                <a:highlight>
+                  <a:srgbClr val="1E1E1E"/>
+                </a:highlight>
+                <a:latin typeface="Consolas" panose="020B0609020204030204" pitchFamily="49" charset="0"/>
+              </a:rPr>
+              <a:t>(</a:t>
+            </a:r>
+            <a:r>
+              <a:rPr lang="en-US" dirty="0" err="1" smtClean="0">
+                <a:solidFill>
+                  <a:srgbClr val="DCDCDC"/>
+                </a:solidFill>
+                <a:highlight>
+                  <a:srgbClr val="1E1E1E"/>
+                </a:highlight>
+                <a:latin typeface="Consolas" panose="020B0609020204030204" pitchFamily="49" charset="0"/>
+              </a:rPr>
+              <a:t>SpriteBatch</a:t>
+            </a:r>
+            <a:r>
+              <a:rPr lang="en-US" dirty="0" smtClean="0">
+                <a:solidFill>
+                  <a:srgbClr val="DCDCDC"/>
+                </a:solidFill>
+                <a:highlight>
+                  <a:srgbClr val="1E1E1E"/>
+                </a:highlight>
+                <a:latin typeface="Consolas" panose="020B0609020204030204" pitchFamily="49" charset="0"/>
+              </a:rPr>
+              <a:t>,</a:t>
+            </a:r>
+          </a:p>
+          <a:p>
+            <a:r>
+              <a:rPr lang="en-US" dirty="0" smtClean="0">
+                <a:solidFill>
+                  <a:srgbClr val="DCDCDC"/>
+                </a:solidFill>
+                <a:highlight>
+                  <a:srgbClr val="1E1E1E"/>
+                </a:highlight>
+                <a:latin typeface="Consolas" panose="020B0609020204030204" pitchFamily="49" charset="0"/>
+              </a:rPr>
+              <a:t>   </a:t>
+            </a:r>
+            <a:r>
+              <a:rPr lang="en-US" dirty="0" err="1" smtClean="0">
+                <a:solidFill>
+                  <a:srgbClr val="DCDCDC"/>
+                </a:solidFill>
+                <a:highlight>
+                  <a:srgbClr val="1E1E1E"/>
+                </a:highlight>
+                <a:latin typeface="Consolas" panose="020B0609020204030204" pitchFamily="49" charset="0"/>
+              </a:rPr>
+              <a:t>i</a:t>
+            </a:r>
+            <a:r>
+              <a:rPr lang="en-US" dirty="0" err="1" smtClean="0">
+                <a:solidFill>
+                  <a:srgbClr val="B4B4B4"/>
+                </a:solidFill>
+                <a:highlight>
+                  <a:srgbClr val="1E1E1E"/>
+                </a:highlight>
+                <a:latin typeface="Consolas" panose="020B0609020204030204" pitchFamily="49" charset="0"/>
+              </a:rPr>
+              <a:t>.</a:t>
+            </a:r>
+            <a:r>
+              <a:rPr lang="en-US" dirty="0" err="1" smtClean="0">
+                <a:solidFill>
+                  <a:srgbClr val="DCDCDC"/>
+                </a:solidFill>
+                <a:highlight>
+                  <a:srgbClr val="1E1E1E"/>
+                </a:highlight>
+                <a:latin typeface="Consolas" panose="020B0609020204030204" pitchFamily="49" charset="0"/>
+              </a:rPr>
+              <a:t>Position</a:t>
+            </a:r>
+            <a:r>
+              <a:rPr lang="en-US" dirty="0" err="1" smtClean="0">
+                <a:solidFill>
+                  <a:srgbClr val="B4B4B4"/>
+                </a:solidFill>
+                <a:highlight>
+                  <a:srgbClr val="1E1E1E"/>
+                </a:highlight>
+                <a:latin typeface="Consolas" panose="020B0609020204030204" pitchFamily="49" charset="0"/>
+              </a:rPr>
+              <a:t>.</a:t>
+            </a:r>
+            <a:r>
+              <a:rPr lang="en-US" dirty="0" err="1" smtClean="0">
+                <a:solidFill>
+                  <a:srgbClr val="DCDCDC"/>
+                </a:solidFill>
+                <a:highlight>
+                  <a:srgbClr val="1E1E1E"/>
+                </a:highlight>
+                <a:latin typeface="Consolas" panose="020B0609020204030204" pitchFamily="49" charset="0"/>
+              </a:rPr>
+              <a:t>GetDrawablePosition</a:t>
+            </a:r>
+            <a:r>
+              <a:rPr lang="en-US" dirty="0" smtClean="0">
+                <a:solidFill>
+                  <a:srgbClr val="DCDCDC"/>
+                </a:solidFill>
+                <a:highlight>
+                  <a:srgbClr val="1E1E1E"/>
+                </a:highlight>
+                <a:latin typeface="Consolas" panose="020B0609020204030204" pitchFamily="49" charset="0"/>
+              </a:rPr>
+              <a:t>(</a:t>
+            </a:r>
+            <a:r>
+              <a:rPr lang="en-US" dirty="0" err="1" smtClean="0">
+                <a:solidFill>
+                  <a:srgbClr val="DCDCDC"/>
+                </a:solidFill>
+                <a:highlight>
+                  <a:srgbClr val="1E1E1E"/>
+                </a:highlight>
+                <a:latin typeface="Consolas" panose="020B0609020204030204" pitchFamily="49" charset="0"/>
+              </a:rPr>
+              <a:t>GamePlay</a:t>
+            </a:r>
+            <a:r>
+              <a:rPr lang="en-US" dirty="0" err="1" smtClean="0">
+                <a:solidFill>
+                  <a:srgbClr val="B4B4B4"/>
+                </a:solidFill>
+                <a:highlight>
+                  <a:srgbClr val="1E1E1E"/>
+                </a:highlight>
+                <a:latin typeface="Consolas" panose="020B0609020204030204" pitchFamily="49" charset="0"/>
+              </a:rPr>
+              <a:t>.</a:t>
+            </a:r>
+            <a:r>
+              <a:rPr lang="en-US" dirty="0" err="1" smtClean="0">
+                <a:solidFill>
+                  <a:srgbClr val="DCDCDC"/>
+                </a:solidFill>
+                <a:highlight>
+                  <a:srgbClr val="1E1E1E"/>
+                </a:highlight>
+                <a:latin typeface="Consolas" panose="020B0609020204030204" pitchFamily="49" charset="0"/>
+              </a:rPr>
+              <a:t>ViewPort</a:t>
+            </a:r>
+            <a:r>
+              <a:rPr lang="en-US" dirty="0">
+                <a:solidFill>
+                  <a:srgbClr val="DCDCDC"/>
+                </a:solidFill>
+                <a:highlight>
+                  <a:srgbClr val="1E1E1E"/>
+                </a:highlight>
+                <a:latin typeface="Consolas" panose="020B0609020204030204" pitchFamily="49" charset="0"/>
+              </a:rPr>
+              <a:t>), </a:t>
+            </a:r>
+          </a:p>
+          <a:p>
+            <a:r>
+              <a:rPr lang="en-US" dirty="0" smtClean="0">
+                <a:solidFill>
+                  <a:srgbClr val="DCDCDC"/>
+                </a:solidFill>
+                <a:highlight>
+                  <a:srgbClr val="1E1E1E"/>
+                </a:highlight>
+                <a:latin typeface="Consolas" panose="020B0609020204030204" pitchFamily="49" charset="0"/>
+              </a:rPr>
+              <a:t>   </a:t>
+            </a:r>
+            <a:r>
+              <a:rPr lang="en-US" dirty="0" err="1" smtClean="0">
+                <a:solidFill>
+                  <a:srgbClr val="B8D7A3"/>
+                </a:solidFill>
+                <a:highlight>
+                  <a:srgbClr val="1E1E1E"/>
+                </a:highlight>
+                <a:latin typeface="Consolas" panose="020B0609020204030204" pitchFamily="49" charset="0"/>
+              </a:rPr>
+              <a:t>SpriteEffects</a:t>
+            </a:r>
+            <a:r>
+              <a:rPr lang="en-US" dirty="0" err="1" smtClean="0">
+                <a:solidFill>
+                  <a:srgbClr val="B4B4B4"/>
+                </a:solidFill>
+                <a:highlight>
+                  <a:srgbClr val="1E1E1E"/>
+                </a:highlight>
+                <a:latin typeface="Consolas" panose="020B0609020204030204" pitchFamily="49" charset="0"/>
+              </a:rPr>
+              <a:t>.</a:t>
+            </a:r>
+            <a:r>
+              <a:rPr lang="en-US" dirty="0" err="1" smtClean="0">
+                <a:solidFill>
+                  <a:srgbClr val="DCDCDC"/>
+                </a:solidFill>
+                <a:highlight>
+                  <a:srgbClr val="1E1E1E"/>
+                </a:highlight>
+                <a:latin typeface="Consolas" panose="020B0609020204030204" pitchFamily="49" charset="0"/>
+              </a:rPr>
+              <a:t>None</a:t>
+            </a:r>
+            <a:r>
+              <a:rPr lang="en-US" dirty="0">
+                <a:solidFill>
+                  <a:srgbClr val="DCDCDC"/>
+                </a:solidFill>
+                <a:highlight>
+                  <a:srgbClr val="1E1E1E"/>
+                </a:highlight>
+                <a:latin typeface="Consolas" panose="020B0609020204030204" pitchFamily="49" charset="0"/>
+              </a:rPr>
+              <a:t>);</a:t>
+            </a:r>
+          </a:p>
+          <a:p>
+            <a:r>
+              <a:rPr lang="en-US" dirty="0" smtClean="0">
+                <a:solidFill>
+                  <a:srgbClr val="DCDCDC"/>
+                </a:solidFill>
+                <a:highlight>
+                  <a:srgbClr val="1E1E1E"/>
+                </a:highlight>
+                <a:latin typeface="Consolas" panose="020B0609020204030204" pitchFamily="49" charset="0"/>
+              </a:rPr>
+              <a:t> });</a:t>
+            </a:r>
+            <a:endParaRPr lang="en-US" dirty="0"/>
+          </a:p>
+        </p:txBody>
+      </p:sp>
+    </p:spTree>
+    <p:extLst>
+      <p:ext uri="{BB962C8B-B14F-4D97-AF65-F5344CB8AC3E}">
+        <p14:creationId xmlns:p14="http://schemas.microsoft.com/office/powerpoint/2010/main" val="3231254921"/>
+      </p:ext>
+    </p:extLst>
+  </p:cSld>
+  <p:clrMapOvr>
+    <a:masterClrMapping/>
+  </p:clrMapOvr>
+  <p:timing>
+    <p:tnLst>
+      <p:par>
+        <p:cTn id="1" dur="indefinite" restart="never" nodeType="tmRoot"/>
+      </p:par>
+    </p:tnLst>
+  </p:timing>
+</p:sld>
+</file>
+
+<file path=ppt/slides/slide11.xml><?xml version="1.0" encoding="utf-8"?>
+<p:sld xmlns:a="http://schemas.openxmlformats.org/drawingml/2006/main" xmlns:r="http://schemas.openxmlformats.org/officeDocument/2006/relationships" xmlns:p="http://schemas.openxmlformats.org/presentationml/2006/main">
+  <p:cSld>
+    <p:spTree>
+      <p:nvGrpSpPr>
+        <p:cNvPr id="1" name=""/>
+        <p:cNvGrpSpPr/>
+        <p:nvPr/>
+      </p:nvGrpSpPr>
+      <p:grpSpPr>
+        <a:xfrm>
+          <a:off x="0" y="0"/>
+          <a:ext cx="0" cy="0"/>
+          <a:chOff x="0" y="0"/>
+          <a:chExt cx="0" cy="0"/>
+        </a:xfrm>
+      </p:grpSpPr>
+      <p:sp>
+        <p:nvSpPr>
           <p:cNvPr id="2" name="Title 1"/>
           <p:cNvSpPr>
             <a:spLocks noGrp="1"/>
@@ -3955,6 +6317,296 @@
           <a:bodyPr/>
           <a:lstStyle/>
           <a:p>
+            <a:pPr algn="ctr"/>
+            <a:r>
+              <a:rPr lang="en-US" dirty="0" smtClean="0"/>
+              <a:t>Contributions of Team</a:t>
+            </a:r>
+            <a:endParaRPr lang="en-US" dirty="0"/>
+          </a:p>
+        </p:txBody>
+      </p:sp>
+    </p:spTree>
+    <p:extLst>
+      <p:ext uri="{BB962C8B-B14F-4D97-AF65-F5344CB8AC3E}">
+        <p14:creationId xmlns:p14="http://schemas.microsoft.com/office/powerpoint/2010/main" val="901892249"/>
+      </p:ext>
+    </p:extLst>
+  </p:cSld>
+  <p:clrMapOvr>
+    <a:masterClrMapping/>
+  </p:clrMapOvr>
+  <p:timing>
+    <p:tnLst>
+      <p:par>
+        <p:cTn id="1" dur="indefinite" restart="never" nodeType="tmRoot"/>
+      </p:par>
+    </p:tnLst>
+  </p:timing>
+</p:sld>
+</file>
+
+<file path=ppt/slides/slide12.xml><?xml version="1.0" encoding="utf-8"?>
+<p:sld xmlns:a="http://schemas.openxmlformats.org/drawingml/2006/main" xmlns:r="http://schemas.openxmlformats.org/officeDocument/2006/relationships" xmlns:p="http://schemas.openxmlformats.org/presentationml/2006/main">
+  <p:cSld>
+    <p:spTree>
+      <p:nvGrpSpPr>
+        <p:cNvPr id="1" name=""/>
+        <p:cNvGrpSpPr/>
+        <p:nvPr/>
+      </p:nvGrpSpPr>
+      <p:grpSpPr>
+        <a:xfrm>
+          <a:off x="0" y="0"/>
+          <a:ext cx="0" cy="0"/>
+          <a:chOff x="0" y="0"/>
+          <a:chExt cx="0" cy="0"/>
+        </a:xfrm>
+      </p:grpSpPr>
+      <p:sp>
+        <p:nvSpPr>
+          <p:cNvPr id="4" name="Title 3"/>
+          <p:cNvSpPr>
+            <a:spLocks noGrp="1"/>
+          </p:cNvSpPr>
+          <p:nvPr>
+            <p:ph type="title"/>
+          </p:nvPr>
+        </p:nvSpPr>
+        <p:spPr/>
+        <p:txBody>
+          <a:bodyPr/>
+          <a:lstStyle/>
+          <a:p>
+            <a:r>
+              <a:rPr lang="en-US" dirty="0" smtClean="0"/>
+              <a:t>Josiah </a:t>
+            </a:r>
+            <a:r>
+              <a:rPr lang="en-US" dirty="0" err="1" smtClean="0"/>
+              <a:t>Burchard</a:t>
+            </a:r>
+            <a:r>
+              <a:rPr lang="en-US" dirty="0" smtClean="0"/>
+              <a:t>: Team Leader</a:t>
+            </a:r>
+            <a:endParaRPr lang="en-US" dirty="0"/>
+          </a:p>
+        </p:txBody>
+      </p:sp>
+      <p:sp>
+        <p:nvSpPr>
+          <p:cNvPr id="5" name="Content Placeholder 4"/>
+          <p:cNvSpPr>
+            <a:spLocks noGrp="1"/>
+          </p:cNvSpPr>
+          <p:nvPr>
+            <p:ph idx="1"/>
+          </p:nvPr>
+        </p:nvSpPr>
+        <p:spPr/>
+        <p:txBody>
+          <a:bodyPr>
+            <a:normAutofit fontScale="92500" lnSpcReduction="10000"/>
+          </a:bodyPr>
+          <a:lstStyle/>
+          <a:p>
+            <a:r>
+              <a:rPr lang="en-US" dirty="0" smtClean="0"/>
+              <a:t>Worked on game project framework (created most of the classes in the project) and wrote code for game elements not related to enemy AI</a:t>
+            </a:r>
+          </a:p>
+          <a:p>
+            <a:r>
+              <a:rPr lang="en-US" dirty="0" smtClean="0"/>
+              <a:t>Refactored code (mainly to maintain object oriented programming)</a:t>
+            </a:r>
+          </a:p>
+          <a:p>
+            <a:r>
+              <a:rPr lang="en-US" dirty="0" smtClean="0"/>
+              <a:t>Drafted basic AI algorithms for enemies (and addressed logical issues with enemy AI)</a:t>
+            </a:r>
+          </a:p>
+          <a:p>
+            <a:r>
+              <a:rPr lang="en-US" dirty="0" smtClean="0"/>
+              <a:t>Debugged issues related to graphical display</a:t>
+            </a:r>
+          </a:p>
+          <a:p>
+            <a:r>
+              <a:rPr lang="en-US" dirty="0" smtClean="0"/>
+              <a:t>Implemented scrolling, explosion, particles, etc.</a:t>
+            </a:r>
+          </a:p>
+          <a:p>
+            <a:r>
+              <a:rPr lang="en-US" dirty="0" smtClean="0"/>
+              <a:t>Added level selection </a:t>
+            </a:r>
+            <a:r>
+              <a:rPr lang="en-US" dirty="0" smtClean="0"/>
+              <a:t>capabilities</a:t>
+            </a:r>
+          </a:p>
+          <a:p>
+            <a:r>
+              <a:rPr lang="en-US" dirty="0" smtClean="0"/>
+              <a:t>Parallel processing</a:t>
+            </a:r>
+            <a:endParaRPr lang="en-US" dirty="0" smtClean="0"/>
+          </a:p>
+          <a:p>
+            <a:endParaRPr lang="en-US" dirty="0"/>
+          </a:p>
+        </p:txBody>
+      </p:sp>
+    </p:spTree>
+    <p:extLst>
+      <p:ext uri="{BB962C8B-B14F-4D97-AF65-F5344CB8AC3E}">
+        <p14:creationId xmlns:p14="http://schemas.microsoft.com/office/powerpoint/2010/main" val="2376909825"/>
+      </p:ext>
+    </p:extLst>
+  </p:cSld>
+  <p:clrMapOvr>
+    <a:masterClrMapping/>
+  </p:clrMapOvr>
+</p:sld>
+</file>
+
+<file path=ppt/slides/slide13.xml><?xml version="1.0" encoding="utf-8"?>
+<p:sld xmlns:a="http://schemas.openxmlformats.org/drawingml/2006/main" xmlns:r="http://schemas.openxmlformats.org/officeDocument/2006/relationships" xmlns:p="http://schemas.openxmlformats.org/presentationml/2006/main">
+  <p:cSld>
+    <p:spTree>
+      <p:nvGrpSpPr>
+        <p:cNvPr id="1" name=""/>
+        <p:cNvGrpSpPr/>
+        <p:nvPr/>
+      </p:nvGrpSpPr>
+      <p:grpSpPr>
+        <a:xfrm>
+          <a:off x="0" y="0"/>
+          <a:ext cx="0" cy="0"/>
+          <a:chOff x="0" y="0"/>
+          <a:chExt cx="0" cy="0"/>
+        </a:xfrm>
+      </p:grpSpPr>
+      <p:sp>
+        <p:nvSpPr>
+          <p:cNvPr id="2" name="Title 1"/>
+          <p:cNvSpPr>
+            <a:spLocks noGrp="1"/>
+          </p:cNvSpPr>
+          <p:nvPr>
+            <p:ph type="title"/>
+          </p:nvPr>
+        </p:nvSpPr>
+        <p:spPr/>
+        <p:txBody>
+          <a:bodyPr/>
+          <a:lstStyle/>
+          <a:p>
+            <a:r>
+              <a:rPr lang="en-US" dirty="0" smtClean="0"/>
+              <a:t>Steven Sebastian: AI</a:t>
+            </a:r>
+            <a:endParaRPr lang="en-US" dirty="0"/>
+          </a:p>
+        </p:txBody>
+      </p:sp>
+      <p:sp>
+        <p:nvSpPr>
+          <p:cNvPr id="3" name="Content Placeholder 2"/>
+          <p:cNvSpPr>
+            <a:spLocks noGrp="1"/>
+          </p:cNvSpPr>
+          <p:nvPr>
+            <p:ph idx="1"/>
+          </p:nvPr>
+        </p:nvSpPr>
+        <p:spPr/>
+        <p:txBody>
+          <a:bodyPr/>
+          <a:lstStyle/>
+          <a:p>
+            <a:r>
+              <a:rPr lang="en-US" dirty="0" smtClean="0"/>
+              <a:t>Wrote AI functions for frog, emu, soda guy, and soda can enemies (and often modified for logical purposes or increase challenge)</a:t>
+            </a:r>
+            <a:endParaRPr lang="en-US" dirty="0"/>
+          </a:p>
+          <a:p>
+            <a:r>
+              <a:rPr lang="en-US" dirty="0" smtClean="0"/>
+              <a:t>Created sprites for solid and semi-solid tiles</a:t>
+            </a:r>
+          </a:p>
+          <a:p>
+            <a:r>
+              <a:rPr lang="en-US" dirty="0" smtClean="0"/>
+              <a:t>Added player health, mercy invincibility, and player death (and Game Over)</a:t>
+            </a:r>
+          </a:p>
+          <a:p>
+            <a:r>
+              <a:rPr lang="en-US" dirty="0" smtClean="0"/>
+              <a:t>Debugged issues related to enemy AI or Game Over</a:t>
+            </a:r>
+          </a:p>
+          <a:p>
+            <a:r>
+              <a:rPr lang="en-US" dirty="0" smtClean="0"/>
+              <a:t>Added additional levels to the game</a:t>
+            </a:r>
+          </a:p>
+        </p:txBody>
+      </p:sp>
+    </p:spTree>
+    <p:extLst>
+      <p:ext uri="{BB962C8B-B14F-4D97-AF65-F5344CB8AC3E}">
+        <p14:creationId xmlns:p14="http://schemas.microsoft.com/office/powerpoint/2010/main" val="1782814773"/>
+      </p:ext>
+    </p:extLst>
+  </p:cSld>
+  <p:clrMapOvr>
+    <a:masterClrMapping/>
+  </p:clrMapOvr>
+</p:sld>
+</file>
+
+<file path=ppt/slides/slide14.xml><?xml version="1.0" encoding="utf-8"?>
+<p:sld xmlns:a="http://schemas.openxmlformats.org/drawingml/2006/main" xmlns:r="http://schemas.openxmlformats.org/officeDocument/2006/relationships" xmlns:p="http://schemas.openxmlformats.org/presentationml/2006/main">
+  <p:cSld>
+    <p:spTree>
+      <p:nvGrpSpPr>
+        <p:cNvPr id="1" name=""/>
+        <p:cNvGrpSpPr/>
+        <p:nvPr/>
+      </p:nvGrpSpPr>
+      <p:grpSpPr>
+        <a:xfrm>
+          <a:off x="0" y="0"/>
+          <a:ext cx="0" cy="0"/>
+          <a:chOff x="0" y="0"/>
+          <a:chExt cx="0" cy="0"/>
+        </a:xfrm>
+      </p:grpSpPr>
+      <p:sp>
+        <p:nvSpPr>
+          <p:cNvPr id="2" name="Title 1"/>
+          <p:cNvSpPr>
+            <a:spLocks noGrp="1"/>
+          </p:cNvSpPr>
+          <p:nvPr>
+            <p:ph type="title"/>
+          </p:nvPr>
+        </p:nvSpPr>
+        <p:spPr/>
+        <p:txBody>
+          <a:bodyPr/>
+          <a:lstStyle/>
+          <a:p>
             <a:r>
               <a:rPr lang="en-US" dirty="0" smtClean="0"/>
               <a:t>Tyler Chapman: Graphics</a:t>
@@ -3980,25 +6632,57 @@
           <a:p>
             <a:r>
               <a:rPr lang="en-US" dirty="0" smtClean="0"/>
-              <a:t>Drew sprites for all game entities except for solid and semi-solid tiles</a:t>
-            </a:r>
-          </a:p>
-          <a:p>
+              <a:t>Custom sprite work</a:t>
+            </a:r>
+          </a:p>
+          <a:p>
+            <a:pPr lvl="1"/>
             <a:r>
               <a:rPr lang="en-US" dirty="0" smtClean="0"/>
-              <a:t>Fixed transparency issues with sprites</a:t>
-            </a:r>
-          </a:p>
-          <a:p>
+              <a:t>Background objects, scenery, player and enemies</a:t>
+            </a:r>
+            <a:endParaRPr lang="en-US" dirty="0" smtClean="0"/>
+          </a:p>
+          <a:p>
+            <a:pPr lvl="1"/>
             <a:r>
               <a:rPr lang="en-US" dirty="0" smtClean="0"/>
-              <a:t>Obtained sounds and background music</a:t>
-            </a:r>
-          </a:p>
-          <a:p>
+              <a:t>Sprite transparency</a:t>
+            </a:r>
+          </a:p>
+          <a:p>
+            <a:pPr lvl="1"/>
             <a:r>
               <a:rPr lang="en-US" dirty="0" smtClean="0"/>
-              <a:t>Created splash screens for project</a:t>
+              <a:t>Animation frames</a:t>
+            </a:r>
+            <a:endParaRPr lang="en-US" dirty="0" smtClean="0"/>
+          </a:p>
+          <a:p>
+            <a:r>
+              <a:rPr lang="en-US" dirty="0" smtClean="0"/>
+              <a:t>Obtained/Implemented</a:t>
+            </a:r>
+            <a:r>
+              <a:rPr lang="en-US" dirty="0" smtClean="0"/>
+              <a:t> sound effects</a:t>
+            </a:r>
+            <a:endParaRPr lang="en-US" dirty="0" smtClean="0"/>
+          </a:p>
+          <a:p>
+            <a:r>
+              <a:rPr lang="en-US" dirty="0" smtClean="0"/>
+              <a:t>Created splash screens for </a:t>
+            </a:r>
+            <a:r>
+              <a:rPr lang="en-US" dirty="0" smtClean="0"/>
+              <a:t>project</a:t>
+            </a:r>
+          </a:p>
+          <a:p>
+            <a:r>
+              <a:rPr lang="en-US" dirty="0" smtClean="0"/>
+              <a:t>Created Game Trailer</a:t>
             </a:r>
             <a:endParaRPr lang="en-US" dirty="0"/>
           </a:p>
@@ -4824,48 +7508,131 @@
             <p:ph type="title"/>
           </p:nvPr>
         </p:nvSpPr>
-        <p:spPr/>
-        <p:txBody>
-          <a:bodyPr/>
+        <p:spPr>
+          <a:xfrm>
+            <a:off x="457200" y="152400"/>
+            <a:ext cx="3886200" cy="1143000"/>
+          </a:xfrm>
+        </p:spPr>
+        <p:txBody>
+          <a:bodyPr>
+            <a:normAutofit/>
+          </a:bodyPr>
           <a:lstStyle/>
           <a:p>
             <a:r>
+              <a:rPr lang="en-US" sz="4000" dirty="0" smtClean="0">
+                <a:solidFill>
+                  <a:srgbClr val="FF0000"/>
+                </a:solidFill>
+              </a:rPr>
+              <a:t>Inheritance</a:t>
+            </a:r>
+            <a:endParaRPr lang="en-US" sz="4000" dirty="0">
+              <a:solidFill>
+                <a:srgbClr val="FF0000"/>
+              </a:solidFill>
+            </a:endParaRPr>
+          </a:p>
+        </p:txBody>
+      </p:sp>
+      <p:sp>
+        <p:nvSpPr>
+          <p:cNvPr id="7" name="Title 1"/>
+          <p:cNvSpPr txBox="1">
+            <a:spLocks/>
+          </p:cNvSpPr>
+          <p:nvPr/>
+        </p:nvSpPr>
+        <p:spPr>
+          <a:xfrm>
+            <a:off x="4800600" y="160560"/>
+            <a:ext cx="3886200" cy="1143000"/>
+          </a:xfrm>
+          <a:prstGeom prst="rect">
+            <a:avLst/>
+          </a:prstGeom>
+        </p:spPr>
+        <p:txBody>
+          <a:bodyPr vert="horz" lIns="0" tIns="45720" rIns="0" bIns="0" anchor="b">
+            <a:normAutofit fontScale="90000"/>
+          </a:bodyPr>
+          <a:lstStyle>
+            <a:lvl1pPr algn="l" rtl="0" eaLnBrk="1" latinLnBrk="0" hangingPunct="1">
+              <a:spcBef>
+                <a:spcPct val="0"/>
+              </a:spcBef>
+              <a:buNone/>
+              <a:defRPr kumimoji="0" sz="5000" b="0" kern="1200">
+                <a:ln>
+                  <a:noFill/>
+                </a:ln>
+                <a:solidFill>
+                  <a:schemeClr val="tx2"/>
+                </a:solidFill>
+                <a:effectLst/>
+                <a:latin typeface="+mj-lt"/>
+                <a:ea typeface="+mj-ea"/>
+                <a:cs typeface="+mj-cs"/>
+              </a:defRPr>
+            </a:lvl1pPr>
+          </a:lstStyle>
+          <a:p>
+            <a:r>
               <a:rPr lang="en-US" dirty="0" smtClean="0"/>
-              <a:t>Contributions of Team</a:t>
+              <a:t>Implementation</a:t>
             </a:r>
             <a:endParaRPr lang="en-US" dirty="0"/>
           </a:p>
         </p:txBody>
       </p:sp>
-      <p:sp>
-        <p:nvSpPr>
-          <p:cNvPr id="7" name="Text Placeholder 6"/>
-          <p:cNvSpPr>
-            <a:spLocks noGrp="1"/>
-          </p:cNvSpPr>
-          <p:nvPr>
-            <p:ph type="body" idx="1"/>
-          </p:nvPr>
-        </p:nvSpPr>
-        <p:spPr/>
-        <p:txBody>
-          <a:bodyPr/>
-          <a:lstStyle/>
-          <a:p>
-            <a:endParaRPr lang="en-US"/>
-          </a:p>
-        </p:txBody>
-      </p:sp>
+      <p:pic>
+        <p:nvPicPr>
+          <p:cNvPr id="8" name="Picture 7"/>
+          <p:cNvPicPr>
+            <a:picLocks noChangeAspect="1"/>
+          </p:cNvPicPr>
+          <p:nvPr/>
+        </p:nvPicPr>
+        <p:blipFill>
+          <a:blip r:embed="rId2">
+            <a:extLst>
+              <a:ext uri="{28A0092B-C50C-407E-A947-70E740481C1C}">
+                <a14:useLocalDpi xmlns:a14="http://schemas.microsoft.com/office/drawing/2010/main" val="0"/>
+              </a:ext>
+            </a:extLst>
+          </a:blip>
+          <a:stretch>
+            <a:fillRect/>
+          </a:stretch>
+        </p:blipFill>
+        <p:spPr>
+          <a:xfrm>
+            <a:off x="882087" y="1303560"/>
+            <a:ext cx="7426208" cy="4640040"/>
+          </a:xfrm>
+          <a:prstGeom prst="rect">
+            <a:avLst/>
+          </a:prstGeom>
+        </p:spPr>
+      </p:pic>
     </p:spTree>
     <p:extLst>
       <p:ext uri="{BB962C8B-B14F-4D97-AF65-F5344CB8AC3E}">
-        <p14:creationId xmlns:p14="http://schemas.microsoft.com/office/powerpoint/2010/main" val="901892249"/>
+        <p14:creationId xmlns:p14="http://schemas.microsoft.com/office/powerpoint/2010/main" val="3520003314"/>
       </p:ext>
     </p:extLst>
   </p:cSld>
   <p:clrMapOvr>
     <a:masterClrMapping/>
   </p:clrMapOvr>
+  <p:timing>
+    <p:tnLst>
+      <p:par>
+        <p:cTn id="1" dur="indefinite" restart="never" nodeType="tmRoot"/>
+      </p:par>
+    </p:tnLst>
+  </p:timing>
 </p:sld>
 </file>
 
@@ -4886,9 +7653,33 @@
           <a:chExt cx="0" cy="0"/>
         </a:xfrm>
       </p:grpSpPr>
-      <p:sp>
-        <p:nvSpPr>
-          <p:cNvPr id="4" name="Title 3"/>
+      <p:pic>
+        <p:nvPicPr>
+          <p:cNvPr id="11" name="Picture 10"/>
+          <p:cNvPicPr>
+            <a:picLocks noChangeAspect="1"/>
+          </p:cNvPicPr>
+          <p:nvPr/>
+        </p:nvPicPr>
+        <p:blipFill>
+          <a:blip r:embed="rId2"/>
+          <a:stretch>
+            <a:fillRect/>
+          </a:stretch>
+        </p:blipFill>
+        <p:spPr>
+          <a:xfrm>
+            <a:off x="0" y="1981200"/>
+            <a:ext cx="9144000" cy="3576532"/>
+          </a:xfrm>
+          <a:prstGeom prst="rect">
+            <a:avLst/>
+          </a:prstGeom>
+        </p:spPr>
+      </p:pic>
+      <p:sp>
+        <p:nvSpPr>
+          <p:cNvPr id="13" name="Title 1"/>
           <p:cNvSpPr>
             <a:spLocks noGrp="1"/>
           </p:cNvSpPr>
@@ -4896,80 +7687,80 @@
             <p:ph type="title"/>
           </p:nvPr>
         </p:nvSpPr>
-        <p:spPr/>
-        <p:txBody>
-          <a:bodyPr/>
-          <a:lstStyle/>
-          <a:p>
-            <a:r>
-              <a:rPr lang="en-US" dirty="0" smtClean="0"/>
-              <a:t>Josiah </a:t>
-            </a:r>
-            <a:r>
-              <a:rPr lang="en-US" dirty="0" err="1" smtClean="0"/>
-              <a:t>Burchard</a:t>
-            </a:r>
-            <a:r>
-              <a:rPr lang="en-US" dirty="0" smtClean="0"/>
-              <a:t>: Team Leader</a:t>
-            </a:r>
-            <a:endParaRPr lang="en-US" dirty="0"/>
-          </a:p>
-        </p:txBody>
-      </p:sp>
-      <p:sp>
-        <p:nvSpPr>
-          <p:cNvPr id="5" name="Content Placeholder 4"/>
-          <p:cNvSpPr>
-            <a:spLocks noGrp="1"/>
-          </p:cNvSpPr>
-          <p:nvPr>
-            <p:ph idx="1"/>
-          </p:nvPr>
-        </p:nvSpPr>
-        <p:spPr/>
+        <p:spPr>
+          <a:xfrm>
+            <a:off x="457200" y="152400"/>
+            <a:ext cx="3886200" cy="1143000"/>
+          </a:xfrm>
+        </p:spPr>
         <p:txBody>
           <a:bodyPr>
-            <a:normAutofit lnSpcReduction="10000"/>
+            <a:normAutofit/>
           </a:bodyPr>
           <a:lstStyle/>
           <a:p>
             <a:r>
+              <a:rPr lang="en-US" sz="4000" dirty="0" smtClean="0">
+                <a:solidFill>
+                  <a:srgbClr val="FF0000"/>
+                </a:solidFill>
+              </a:rPr>
+              <a:t>Map Maker</a:t>
+            </a:r>
+            <a:endParaRPr lang="en-US" sz="4000" dirty="0">
+              <a:solidFill>
+                <a:srgbClr val="FF0000"/>
+              </a:solidFill>
+            </a:endParaRPr>
+          </a:p>
+        </p:txBody>
+      </p:sp>
+      <p:sp>
+        <p:nvSpPr>
+          <p:cNvPr id="14" name="Title 1"/>
+          <p:cNvSpPr txBox="1">
+            <a:spLocks/>
+          </p:cNvSpPr>
+          <p:nvPr/>
+        </p:nvSpPr>
+        <p:spPr>
+          <a:xfrm>
+            <a:off x="4800600" y="160560"/>
+            <a:ext cx="3886200" cy="1143000"/>
+          </a:xfrm>
+          <a:prstGeom prst="rect">
+            <a:avLst/>
+          </a:prstGeom>
+        </p:spPr>
+        <p:txBody>
+          <a:bodyPr vert="horz" lIns="0" tIns="45720" rIns="0" bIns="0" anchor="b">
+            <a:normAutofit fontScale="90000"/>
+          </a:bodyPr>
+          <a:lstStyle>
+            <a:lvl1pPr algn="l" rtl="0" eaLnBrk="1" latinLnBrk="0" hangingPunct="1">
+              <a:spcBef>
+                <a:spcPct val="0"/>
+              </a:spcBef>
+              <a:buNone/>
+              <a:defRPr kumimoji="0" sz="5000" b="0" kern="1200">
+                <a:ln>
+                  <a:noFill/>
+                </a:ln>
+                <a:solidFill>
+                  <a:schemeClr val="tx2"/>
+                </a:solidFill>
+                <a:effectLst/>
+                <a:latin typeface="+mj-lt"/>
+                <a:ea typeface="+mj-ea"/>
+                <a:cs typeface="+mj-cs"/>
+              </a:defRPr>
+            </a:lvl1pPr>
+          </a:lstStyle>
+          <a:p>
+            <a:r>
               <a:rPr lang="en-US" dirty="0" smtClean="0"/>
-              <a:t>Worked on game project framework (created most of the classes in the project) and wrote code for game elements not related to enemy AI</a:t>
-            </a:r>
-          </a:p>
-          <a:p>
-            <a:r>
-              <a:rPr lang="en-US" dirty="0" smtClean="0"/>
-              <a:t>Refactored code (mainly to maintain object oriented programming)</a:t>
-            </a:r>
-          </a:p>
-          <a:p>
-            <a:r>
-              <a:rPr lang="en-US" dirty="0" smtClean="0"/>
-              <a:t>Drafted basic AI algorithms for enemies (and addressed logical issues with enemy AI)</a:t>
-            </a:r>
-          </a:p>
-          <a:p>
-            <a:r>
-              <a:rPr lang="en-US" dirty="0" smtClean="0"/>
-              <a:t>Debugged issues related to graphical display</a:t>
-            </a:r>
-          </a:p>
-          <a:p>
-            <a:r>
-              <a:rPr lang="en-US" dirty="0" smtClean="0"/>
-              <a:t>Implemented scrolling, explosion, particles, etc.</a:t>
-            </a:r>
-          </a:p>
-          <a:p>
-            <a:r>
-              <a:rPr lang="en-US" dirty="0" smtClean="0"/>
-              <a:t>Added level selection capabilities</a:t>
-            </a:r>
-          </a:p>
-          <a:p>
+              <a:t>Implementation</a:t>
+            </a:r>
             <a:endParaRPr lang="en-US" dirty="0"/>
           </a:p>
         </p:txBody>
@@ -4977,13 +7768,20 @@
     </p:spTree>
     <p:extLst>
       <p:ext uri="{BB962C8B-B14F-4D97-AF65-F5344CB8AC3E}">
-        <p14:creationId xmlns:p14="http://schemas.microsoft.com/office/powerpoint/2010/main" val="2376909825"/>
+        <p14:creationId xmlns:p14="http://schemas.microsoft.com/office/powerpoint/2010/main" val="3940743355"/>
       </p:ext>
     </p:extLst>
   </p:cSld>
   <p:clrMapOvr>
     <a:masterClrMapping/>
   </p:clrMapOvr>
+  <p:timing>
+    <p:tnLst>
+      <p:par>
+        <p:cTn id="1" dur="indefinite" restart="never" nodeType="tmRoot"/>
+      </p:par>
+    </p:tnLst>
+  </p:timing>
 </p:sld>
 </file>
 
@@ -5006,7 +7804,7 @@
       </p:grpSpPr>
       <p:sp>
         <p:nvSpPr>
-          <p:cNvPr id="2" name="Title 1"/>
+          <p:cNvPr id="4" name="Title 1"/>
           <p:cNvSpPr>
             <a:spLocks noGrp="1"/>
           </p:cNvSpPr>
@@ -5014,14 +7812,79 @@
             <p:ph type="title"/>
           </p:nvPr>
         </p:nvSpPr>
-        <p:spPr/>
-        <p:txBody>
-          <a:bodyPr/>
+        <p:spPr>
+          <a:xfrm>
+            <a:off x="457200" y="152400"/>
+            <a:ext cx="3886200" cy="1143000"/>
+          </a:xfrm>
+        </p:spPr>
+        <p:txBody>
+          <a:bodyPr>
+            <a:normAutofit/>
+          </a:bodyPr>
           <a:lstStyle/>
           <a:p>
             <a:r>
+              <a:rPr lang="en-US" sz="4000" dirty="0" smtClean="0">
+                <a:solidFill>
+                  <a:srgbClr val="FF0000"/>
+                </a:solidFill>
+              </a:rPr>
+              <a:t>Game Flow</a:t>
+            </a:r>
+            <a:endParaRPr lang="en-US" sz="4000" dirty="0">
+              <a:solidFill>
+                <a:srgbClr val="FF0000"/>
+              </a:solidFill>
+            </a:endParaRPr>
+          </a:p>
+        </p:txBody>
+      </p:sp>
+      <p:sp>
+        <p:nvSpPr>
+          <p:cNvPr id="5" name="Title 1"/>
+          <p:cNvSpPr txBox="1">
+            <a:spLocks/>
+          </p:cNvSpPr>
+          <p:nvPr/>
+        </p:nvSpPr>
+        <p:spPr>
+          <a:xfrm>
+            <a:off x="4800600" y="160560"/>
+            <a:ext cx="3886200" cy="1143000"/>
+          </a:xfrm>
+          <a:prstGeom prst="rect">
+            <a:avLst/>
+          </a:prstGeom>
+        </p:spPr>
+        <p:txBody>
+          <a:bodyPr vert="horz" lIns="0" tIns="45720" rIns="0" bIns="0" anchor="b">
+            <a:normAutofit fontScale="90000"/>
+          </a:bodyPr>
+          <a:lstStyle>
+            <a:lvl1pPr algn="l" rtl="0" eaLnBrk="1" latinLnBrk="0" hangingPunct="1">
+              <a:spcBef>
+                <a:spcPct val="0"/>
+              </a:spcBef>
+              <a:buNone/>
+              <a:defRPr kumimoji="0" sz="5000" b="0" kern="1200">
+                <a:ln>
+                  <a:noFill/>
+                </a:ln>
+                <a:solidFill>
+                  <a:schemeClr val="tx2"/>
+                </a:solidFill>
+                <a:effectLst/>
+                <a:latin typeface="+mj-lt"/>
+                <a:ea typeface="+mj-ea"/>
+                <a:cs typeface="+mj-cs"/>
+              </a:defRPr>
+            </a:lvl1pPr>
+          </a:lstStyle>
+          <a:p>
+            <a:r>
               <a:rPr lang="en-US" dirty="0" smtClean="0"/>
-              <a:t>Steven Sebastian: AI</a:t>
+              <a:t>Implementation</a:t>
             </a:r>
             <a:endParaRPr lang="en-US" dirty="0"/>
           </a:p>
@@ -5029,61 +7892,1357 @@
       </p:sp>
       <p:sp>
         <p:nvSpPr>
-          <p:cNvPr id="3" name="Content Placeholder 2"/>
-          <p:cNvSpPr>
-            <a:spLocks noGrp="1"/>
-          </p:cNvSpPr>
-          <p:nvPr>
-            <p:ph idx="1"/>
-          </p:nvPr>
-        </p:nvSpPr>
-        <p:spPr/>
-        <p:txBody>
-          <a:bodyPr/>
+          <p:cNvPr id="6" name="Rectangle 5"/>
+          <p:cNvSpPr/>
+          <p:nvPr/>
+        </p:nvSpPr>
+        <p:spPr>
+          <a:xfrm>
+            <a:off x="152400" y="1600200"/>
+            <a:ext cx="8991600" cy="2554545"/>
+          </a:xfrm>
+          <a:prstGeom prst="rect">
+            <a:avLst/>
+          </a:prstGeom>
+        </p:spPr>
+        <p:txBody>
+          <a:bodyPr wrap="square">
+            <a:spAutoFit/>
+          </a:bodyPr>
           <a:lstStyle/>
           <a:p>
             <a:r>
-              <a:rPr lang="en-US" dirty="0" smtClean="0"/>
-              <a:t>Wrote AI functions for frog, emu, soda guy, and soda can enemies (and often modified for logical purposes or increase challenge)</a:t>
-            </a:r>
-            <a:endParaRPr lang="en-US" dirty="0"/>
-          </a:p>
-          <a:p>
-            <a:r>
-              <a:rPr lang="en-US" dirty="0" smtClean="0"/>
-              <a:t>Created sprites for solid and semi-solid tiles</a:t>
-            </a:r>
-          </a:p>
-          <a:p>
-            <a:r>
-              <a:rPr lang="en-US" dirty="0" smtClean="0"/>
-              <a:t>Added player health, mercy invincibility, and player death (and Game Over)</a:t>
-            </a:r>
-          </a:p>
-          <a:p>
-            <a:r>
-              <a:rPr lang="en-US" dirty="0" smtClean="0"/>
-              <a:t>Debugged issues related to enemy AI or Game Over</a:t>
-            </a:r>
-          </a:p>
-          <a:p>
-            <a:r>
-              <a:rPr lang="en-US" dirty="0" smtClean="0"/>
-              <a:t>Added additional levels to the game</a:t>
-            </a:r>
+              <a:rPr lang="en-US" sz="1600" dirty="0" smtClean="0">
+                <a:solidFill>
+                  <a:srgbClr val="569CD6"/>
+                </a:solidFill>
+                <a:highlight>
+                  <a:srgbClr val="1E1E1E"/>
+                </a:highlight>
+                <a:latin typeface="Consolas" panose="020B0609020204030204" pitchFamily="49" charset="0"/>
+              </a:rPr>
+              <a:t>private</a:t>
+            </a:r>
+            <a:r>
+              <a:rPr lang="en-US" sz="1600" dirty="0" smtClean="0">
+                <a:solidFill>
+                  <a:srgbClr val="DCDCDC"/>
+                </a:solidFill>
+                <a:highlight>
+                  <a:srgbClr val="1E1E1E"/>
+                </a:highlight>
+                <a:latin typeface="Consolas" panose="020B0609020204030204" pitchFamily="49" charset="0"/>
+              </a:rPr>
+              <a:t> </a:t>
+            </a:r>
+            <a:r>
+              <a:rPr lang="en-US" sz="1600" dirty="0">
+                <a:solidFill>
+                  <a:srgbClr val="569CD6"/>
+                </a:solidFill>
+                <a:highlight>
+                  <a:srgbClr val="1E1E1E"/>
+                </a:highlight>
+                <a:latin typeface="Consolas" panose="020B0609020204030204" pitchFamily="49" charset="0"/>
+              </a:rPr>
+              <a:t>void</a:t>
+            </a:r>
+            <a:r>
+              <a:rPr lang="en-US" sz="1600" dirty="0">
+                <a:solidFill>
+                  <a:srgbClr val="DCDCDC"/>
+                </a:solidFill>
+                <a:highlight>
+                  <a:srgbClr val="1E1E1E"/>
+                </a:highlight>
+                <a:latin typeface="Consolas" panose="020B0609020204030204" pitchFamily="49" charset="0"/>
+              </a:rPr>
+              <a:t> </a:t>
+            </a:r>
+            <a:r>
+              <a:rPr lang="en-US" sz="1600" dirty="0" err="1">
+                <a:solidFill>
+                  <a:srgbClr val="DCDCDC"/>
+                </a:solidFill>
+                <a:highlight>
+                  <a:srgbClr val="1E1E1E"/>
+                </a:highlight>
+                <a:latin typeface="Consolas" panose="020B0609020204030204" pitchFamily="49" charset="0"/>
+              </a:rPr>
+              <a:t>Update_ThreadSafe</a:t>
+            </a:r>
+            <a:r>
+              <a:rPr lang="en-US" sz="1600" dirty="0">
+                <a:solidFill>
+                  <a:srgbClr val="DCDCDC"/>
+                </a:solidFill>
+                <a:highlight>
+                  <a:srgbClr val="1E1E1E"/>
+                </a:highlight>
+                <a:latin typeface="Consolas" panose="020B0609020204030204" pitchFamily="49" charset="0"/>
+              </a:rPr>
+              <a:t>(</a:t>
+            </a:r>
+            <a:r>
+              <a:rPr lang="en-US" sz="1600" dirty="0">
+                <a:solidFill>
+                  <a:srgbClr val="569CD6"/>
+                </a:solidFill>
+                <a:highlight>
+                  <a:srgbClr val="1E1E1E"/>
+                </a:highlight>
+                <a:latin typeface="Consolas" panose="020B0609020204030204" pitchFamily="49" charset="0"/>
+              </a:rPr>
+              <a:t>double</a:t>
+            </a:r>
+            <a:r>
+              <a:rPr lang="en-US" sz="1600" dirty="0">
+                <a:solidFill>
+                  <a:srgbClr val="DCDCDC"/>
+                </a:solidFill>
+                <a:highlight>
+                  <a:srgbClr val="1E1E1E"/>
+                </a:highlight>
+                <a:latin typeface="Consolas" panose="020B0609020204030204" pitchFamily="49" charset="0"/>
+              </a:rPr>
+              <a:t> elapsed, </a:t>
+            </a:r>
+            <a:r>
+              <a:rPr lang="en-US" sz="1600" dirty="0">
+                <a:solidFill>
+                  <a:srgbClr val="4EC9B0"/>
+                </a:solidFill>
+                <a:highlight>
+                  <a:srgbClr val="1E1E1E"/>
+                </a:highlight>
+                <a:latin typeface="Consolas" panose="020B0609020204030204" pitchFamily="49" charset="0"/>
+              </a:rPr>
+              <a:t>Rectangle</a:t>
+            </a:r>
+            <a:r>
+              <a:rPr lang="en-US" sz="1600" dirty="0">
+                <a:solidFill>
+                  <a:srgbClr val="DCDCDC"/>
+                </a:solidFill>
+                <a:highlight>
+                  <a:srgbClr val="1E1E1E"/>
+                </a:highlight>
+                <a:latin typeface="Consolas" panose="020B0609020204030204" pitchFamily="49" charset="0"/>
+              </a:rPr>
+              <a:t> </a:t>
+            </a:r>
+            <a:r>
+              <a:rPr lang="en-US" sz="1600" dirty="0" err="1">
+                <a:solidFill>
+                  <a:srgbClr val="DCDCDC"/>
+                </a:solidFill>
+                <a:highlight>
+                  <a:srgbClr val="1E1E1E"/>
+                </a:highlight>
+                <a:latin typeface="Consolas" panose="020B0609020204030204" pitchFamily="49" charset="0"/>
+              </a:rPr>
+              <a:t>updateBounds</a:t>
+            </a:r>
+            <a:r>
+              <a:rPr lang="en-US" sz="1600" dirty="0">
+                <a:solidFill>
+                  <a:srgbClr val="DCDCDC"/>
+                </a:solidFill>
+                <a:highlight>
+                  <a:srgbClr val="1E1E1E"/>
+                </a:highlight>
+                <a:latin typeface="Consolas" panose="020B0609020204030204" pitchFamily="49" charset="0"/>
+              </a:rPr>
+              <a:t>)</a:t>
+            </a:r>
+          </a:p>
+          <a:p>
+            <a:r>
+              <a:rPr lang="en-US" sz="1600" dirty="0" smtClean="0">
+                <a:solidFill>
+                  <a:srgbClr val="DCDCDC"/>
+                </a:solidFill>
+                <a:highlight>
+                  <a:srgbClr val="1E1E1E"/>
+                </a:highlight>
+                <a:latin typeface="Consolas" panose="020B0609020204030204" pitchFamily="49" charset="0"/>
+              </a:rPr>
+              <a:t>{</a:t>
+            </a:r>
+            <a:endParaRPr lang="en-US" sz="1600" dirty="0">
+              <a:solidFill>
+                <a:srgbClr val="DCDCDC"/>
+              </a:solidFill>
+              <a:highlight>
+                <a:srgbClr val="1E1E1E"/>
+              </a:highlight>
+              <a:latin typeface="Consolas" panose="020B0609020204030204" pitchFamily="49" charset="0"/>
+            </a:endParaRPr>
+          </a:p>
+          <a:p>
+            <a:r>
+              <a:rPr lang="en-US" sz="1600" dirty="0" smtClean="0">
+                <a:solidFill>
+                  <a:srgbClr val="4EC9B0"/>
+                </a:solidFill>
+                <a:highlight>
+                  <a:srgbClr val="1E1E1E"/>
+                </a:highlight>
+                <a:latin typeface="Consolas" panose="020B0609020204030204" pitchFamily="49" charset="0"/>
+              </a:rPr>
+              <a:t> List</a:t>
+            </a:r>
+            <a:r>
+              <a:rPr lang="en-US" sz="1600" dirty="0" smtClean="0">
+                <a:solidFill>
+                  <a:srgbClr val="B4B4B4"/>
+                </a:solidFill>
+                <a:highlight>
+                  <a:srgbClr val="1E1E1E"/>
+                </a:highlight>
+                <a:latin typeface="Consolas" panose="020B0609020204030204" pitchFamily="49" charset="0"/>
+              </a:rPr>
+              <a:t>&lt;</a:t>
+            </a:r>
+            <a:r>
+              <a:rPr lang="en-US" sz="1600" dirty="0" err="1" smtClean="0">
+                <a:solidFill>
+                  <a:srgbClr val="4EC9B0"/>
+                </a:solidFill>
+                <a:highlight>
+                  <a:srgbClr val="1E1E1E"/>
+                </a:highlight>
+                <a:latin typeface="Consolas" panose="020B0609020204030204" pitchFamily="49" charset="0"/>
+              </a:rPr>
+              <a:t>AnimatedObject</a:t>
+            </a:r>
+            <a:r>
+              <a:rPr lang="en-US" sz="1600" dirty="0">
+                <a:solidFill>
+                  <a:srgbClr val="B4B4B4"/>
+                </a:solidFill>
+                <a:highlight>
+                  <a:srgbClr val="1E1E1E"/>
+                </a:highlight>
+                <a:latin typeface="Consolas" panose="020B0609020204030204" pitchFamily="49" charset="0"/>
+              </a:rPr>
+              <a:t>&gt;</a:t>
+            </a:r>
+            <a:r>
+              <a:rPr lang="en-US" sz="1600" dirty="0">
+                <a:solidFill>
+                  <a:srgbClr val="DCDCDC"/>
+                </a:solidFill>
+                <a:highlight>
+                  <a:srgbClr val="1E1E1E"/>
+                </a:highlight>
+                <a:latin typeface="Consolas" panose="020B0609020204030204" pitchFamily="49" charset="0"/>
+              </a:rPr>
+              <a:t> </a:t>
+            </a:r>
+            <a:r>
+              <a:rPr lang="en-US" sz="1600" dirty="0" err="1">
+                <a:solidFill>
+                  <a:srgbClr val="DCDCDC"/>
+                </a:solidFill>
+                <a:highlight>
+                  <a:srgbClr val="1E1E1E"/>
+                </a:highlight>
+                <a:latin typeface="Consolas" panose="020B0609020204030204" pitchFamily="49" charset="0"/>
+              </a:rPr>
+              <a:t>gameObjects</a:t>
+            </a:r>
+            <a:r>
+              <a:rPr lang="en-US" sz="1600" dirty="0">
+                <a:solidFill>
+                  <a:srgbClr val="DCDCDC"/>
+                </a:solidFill>
+                <a:highlight>
+                  <a:srgbClr val="1E1E1E"/>
+                </a:highlight>
+                <a:latin typeface="Consolas" panose="020B0609020204030204" pitchFamily="49" charset="0"/>
+              </a:rPr>
+              <a:t> </a:t>
+            </a:r>
+            <a:r>
+              <a:rPr lang="en-US" sz="1600" dirty="0">
+                <a:solidFill>
+                  <a:srgbClr val="B4B4B4"/>
+                </a:solidFill>
+                <a:highlight>
+                  <a:srgbClr val="1E1E1E"/>
+                </a:highlight>
+                <a:latin typeface="Consolas" panose="020B0609020204030204" pitchFamily="49" charset="0"/>
+              </a:rPr>
+              <a:t>=</a:t>
+            </a:r>
+            <a:endParaRPr lang="en-US" sz="1600" dirty="0">
+              <a:solidFill>
+                <a:srgbClr val="DCDCDC"/>
+              </a:solidFill>
+              <a:highlight>
+                <a:srgbClr val="1E1E1E"/>
+              </a:highlight>
+              <a:latin typeface="Consolas" panose="020B0609020204030204" pitchFamily="49" charset="0"/>
+            </a:endParaRPr>
+          </a:p>
+          <a:p>
+            <a:r>
+              <a:rPr lang="en-US" sz="1600" dirty="0" smtClean="0">
+                <a:solidFill>
+                  <a:srgbClr val="DCDCDC"/>
+                </a:solidFill>
+                <a:highlight>
+                  <a:srgbClr val="1E1E1E"/>
+                </a:highlight>
+                <a:latin typeface="Consolas" panose="020B0609020204030204" pitchFamily="49" charset="0"/>
+              </a:rPr>
+              <a:t> </a:t>
+            </a:r>
+            <a:r>
+              <a:rPr lang="en-US" sz="1600" dirty="0" err="1" smtClean="0">
+                <a:solidFill>
+                  <a:srgbClr val="DCDCDC"/>
+                </a:solidFill>
+                <a:highlight>
+                  <a:srgbClr val="1E1E1E"/>
+                </a:highlight>
+                <a:latin typeface="Consolas" panose="020B0609020204030204" pitchFamily="49" charset="0"/>
+              </a:rPr>
+              <a:t>GamePlay</a:t>
+            </a:r>
+            <a:r>
+              <a:rPr lang="en-US" sz="1600" dirty="0" err="1" smtClean="0">
+                <a:solidFill>
+                  <a:srgbClr val="B4B4B4"/>
+                </a:solidFill>
+                <a:highlight>
+                  <a:srgbClr val="1E1E1E"/>
+                </a:highlight>
+                <a:latin typeface="Consolas" panose="020B0609020204030204" pitchFamily="49" charset="0"/>
+              </a:rPr>
+              <a:t>.</a:t>
+            </a:r>
+            <a:r>
+              <a:rPr lang="en-US" sz="1600" dirty="0" err="1" smtClean="0">
+                <a:solidFill>
+                  <a:srgbClr val="DCDCDC"/>
+                </a:solidFill>
+                <a:highlight>
+                  <a:srgbClr val="1E1E1E"/>
+                </a:highlight>
+                <a:latin typeface="Consolas" panose="020B0609020204030204" pitchFamily="49" charset="0"/>
+              </a:rPr>
+              <a:t>LevelObjects</a:t>
+            </a:r>
+            <a:endParaRPr lang="en-US" sz="1600" dirty="0">
+              <a:solidFill>
+                <a:srgbClr val="DCDCDC"/>
+              </a:solidFill>
+              <a:highlight>
+                <a:srgbClr val="1E1E1E"/>
+              </a:highlight>
+              <a:latin typeface="Consolas" panose="020B0609020204030204" pitchFamily="49" charset="0"/>
+            </a:endParaRPr>
+          </a:p>
+          <a:p>
+            <a:r>
+              <a:rPr lang="en-US" sz="1600" dirty="0" smtClean="0">
+                <a:solidFill>
+                  <a:srgbClr val="B4B4B4"/>
+                </a:solidFill>
+                <a:highlight>
+                  <a:srgbClr val="1E1E1E"/>
+                </a:highlight>
+                <a:latin typeface="Consolas" panose="020B0609020204030204" pitchFamily="49" charset="0"/>
+              </a:rPr>
+              <a:t> .</a:t>
+            </a:r>
+            <a:r>
+              <a:rPr lang="en-US" sz="1600" dirty="0">
+                <a:solidFill>
+                  <a:srgbClr val="DCDCDC"/>
+                </a:solidFill>
+                <a:highlight>
+                  <a:srgbClr val="1E1E1E"/>
+                </a:highlight>
+                <a:latin typeface="Consolas" panose="020B0609020204030204" pitchFamily="49" charset="0"/>
+              </a:rPr>
+              <a:t>Where(</a:t>
+            </a:r>
+            <a:r>
+              <a:rPr lang="en-US" sz="1600" dirty="0" err="1">
+                <a:solidFill>
+                  <a:srgbClr val="DCDCDC"/>
+                </a:solidFill>
+                <a:highlight>
+                  <a:srgbClr val="1E1E1E"/>
+                </a:highlight>
+                <a:latin typeface="Consolas" panose="020B0609020204030204" pitchFamily="49" charset="0"/>
+              </a:rPr>
+              <a:t>i</a:t>
+            </a:r>
+            <a:r>
+              <a:rPr lang="en-US" sz="1600" dirty="0">
+                <a:solidFill>
+                  <a:srgbClr val="DCDCDC"/>
+                </a:solidFill>
+                <a:highlight>
+                  <a:srgbClr val="1E1E1E"/>
+                </a:highlight>
+                <a:latin typeface="Consolas" panose="020B0609020204030204" pitchFamily="49" charset="0"/>
+              </a:rPr>
+              <a:t> </a:t>
+            </a:r>
+            <a:r>
+              <a:rPr lang="en-US" sz="1600" dirty="0">
+                <a:solidFill>
+                  <a:srgbClr val="B4B4B4"/>
+                </a:solidFill>
+                <a:highlight>
+                  <a:srgbClr val="1E1E1E"/>
+                </a:highlight>
+                <a:latin typeface="Consolas" panose="020B0609020204030204" pitchFamily="49" charset="0"/>
+              </a:rPr>
+              <a:t>=&gt;</a:t>
+            </a:r>
+            <a:r>
+              <a:rPr lang="en-US" sz="1600" dirty="0">
+                <a:solidFill>
+                  <a:srgbClr val="DCDCDC"/>
+                </a:solidFill>
+                <a:highlight>
+                  <a:srgbClr val="1E1E1E"/>
+                </a:highlight>
+                <a:latin typeface="Consolas" panose="020B0609020204030204" pitchFamily="49" charset="0"/>
+              </a:rPr>
+              <a:t> </a:t>
+            </a:r>
+            <a:r>
+              <a:rPr lang="en-US" sz="1600" dirty="0" err="1">
+                <a:solidFill>
+                  <a:srgbClr val="DCDCDC"/>
+                </a:solidFill>
+                <a:highlight>
+                  <a:srgbClr val="1E1E1E"/>
+                </a:highlight>
+                <a:latin typeface="Consolas" panose="020B0609020204030204" pitchFamily="49" charset="0"/>
+              </a:rPr>
+              <a:t>i</a:t>
+            </a:r>
+            <a:r>
+              <a:rPr lang="en-US" sz="1600" dirty="0" err="1">
+                <a:solidFill>
+                  <a:srgbClr val="B4B4B4"/>
+                </a:solidFill>
+                <a:highlight>
+                  <a:srgbClr val="1E1E1E"/>
+                </a:highlight>
+                <a:latin typeface="Consolas" panose="020B0609020204030204" pitchFamily="49" charset="0"/>
+              </a:rPr>
+              <a:t>.</a:t>
+            </a:r>
+            <a:r>
+              <a:rPr lang="en-US" sz="1600" dirty="0" err="1">
+                <a:solidFill>
+                  <a:srgbClr val="DCDCDC"/>
+                </a:solidFill>
+                <a:highlight>
+                  <a:srgbClr val="1E1E1E"/>
+                </a:highlight>
+                <a:latin typeface="Consolas" panose="020B0609020204030204" pitchFamily="49" charset="0"/>
+              </a:rPr>
+              <a:t>IsThreadSafe</a:t>
+            </a:r>
+            <a:r>
+              <a:rPr lang="en-US" sz="1600" dirty="0">
+                <a:solidFill>
+                  <a:srgbClr val="DCDCDC"/>
+                </a:solidFill>
+                <a:highlight>
+                  <a:srgbClr val="1E1E1E"/>
+                </a:highlight>
+                <a:latin typeface="Consolas" panose="020B0609020204030204" pitchFamily="49" charset="0"/>
+              </a:rPr>
+              <a:t> </a:t>
+            </a:r>
+            <a:r>
+              <a:rPr lang="en-US" sz="1600" dirty="0">
+                <a:solidFill>
+                  <a:srgbClr val="B4B4B4"/>
+                </a:solidFill>
+                <a:highlight>
+                  <a:srgbClr val="1E1E1E"/>
+                </a:highlight>
+                <a:latin typeface="Consolas" panose="020B0609020204030204" pitchFamily="49" charset="0"/>
+              </a:rPr>
+              <a:t>&amp;&amp;</a:t>
+            </a:r>
+            <a:r>
+              <a:rPr lang="en-US" sz="1600" dirty="0">
+                <a:solidFill>
+                  <a:srgbClr val="DCDCDC"/>
+                </a:solidFill>
+                <a:highlight>
+                  <a:srgbClr val="1E1E1E"/>
+                </a:highlight>
+                <a:latin typeface="Consolas" panose="020B0609020204030204" pitchFamily="49" charset="0"/>
+              </a:rPr>
+              <a:t> </a:t>
+            </a:r>
+            <a:r>
+              <a:rPr lang="en-US" sz="1600" dirty="0" err="1">
+                <a:solidFill>
+                  <a:srgbClr val="DCDCDC"/>
+                </a:solidFill>
+                <a:highlight>
+                  <a:srgbClr val="1E1E1E"/>
+                </a:highlight>
+                <a:latin typeface="Consolas" panose="020B0609020204030204" pitchFamily="49" charset="0"/>
+              </a:rPr>
+              <a:t>i</a:t>
+            </a:r>
+            <a:r>
+              <a:rPr lang="en-US" sz="1600" dirty="0" err="1">
+                <a:solidFill>
+                  <a:srgbClr val="B4B4B4"/>
+                </a:solidFill>
+                <a:highlight>
+                  <a:srgbClr val="1E1E1E"/>
+                </a:highlight>
+                <a:latin typeface="Consolas" panose="020B0609020204030204" pitchFamily="49" charset="0"/>
+              </a:rPr>
+              <a:t>.</a:t>
+            </a:r>
+            <a:r>
+              <a:rPr lang="en-US" sz="1600" dirty="0" err="1">
+                <a:solidFill>
+                  <a:srgbClr val="DCDCDC"/>
+                </a:solidFill>
+                <a:highlight>
+                  <a:srgbClr val="1E1E1E"/>
+                </a:highlight>
+                <a:latin typeface="Consolas" panose="020B0609020204030204" pitchFamily="49" charset="0"/>
+              </a:rPr>
+              <a:t>Alive</a:t>
+            </a:r>
+            <a:r>
+              <a:rPr lang="en-US" sz="1600" dirty="0">
+                <a:solidFill>
+                  <a:srgbClr val="DCDCDC"/>
+                </a:solidFill>
+                <a:highlight>
+                  <a:srgbClr val="1E1E1E"/>
+                </a:highlight>
+                <a:latin typeface="Consolas" panose="020B0609020204030204" pitchFamily="49" charset="0"/>
+              </a:rPr>
+              <a:t> </a:t>
+            </a:r>
+            <a:r>
+              <a:rPr lang="en-US" sz="1600" dirty="0">
+                <a:solidFill>
+                  <a:srgbClr val="B4B4B4"/>
+                </a:solidFill>
+                <a:highlight>
+                  <a:srgbClr val="1E1E1E"/>
+                </a:highlight>
+                <a:latin typeface="Consolas" panose="020B0609020204030204" pitchFamily="49" charset="0"/>
+              </a:rPr>
+              <a:t>&amp;&amp;</a:t>
+            </a:r>
+            <a:r>
+              <a:rPr lang="en-US" sz="1600" dirty="0">
+                <a:solidFill>
+                  <a:srgbClr val="DCDCDC"/>
+                </a:solidFill>
+                <a:highlight>
+                  <a:srgbClr val="1E1E1E"/>
+                </a:highlight>
+                <a:latin typeface="Consolas" panose="020B0609020204030204" pitchFamily="49" charset="0"/>
+              </a:rPr>
+              <a:t> </a:t>
+            </a:r>
+            <a:r>
+              <a:rPr lang="en-US" sz="1600" dirty="0" err="1">
+                <a:solidFill>
+                  <a:srgbClr val="DCDCDC"/>
+                </a:solidFill>
+                <a:highlight>
+                  <a:srgbClr val="1E1E1E"/>
+                </a:highlight>
+                <a:latin typeface="Consolas" panose="020B0609020204030204" pitchFamily="49" charset="0"/>
+              </a:rPr>
+              <a:t>i</a:t>
+            </a:r>
+            <a:r>
+              <a:rPr lang="en-US" sz="1600" dirty="0" err="1">
+                <a:solidFill>
+                  <a:srgbClr val="B4B4B4"/>
+                </a:solidFill>
+                <a:highlight>
+                  <a:srgbClr val="1E1E1E"/>
+                </a:highlight>
+                <a:latin typeface="Consolas" panose="020B0609020204030204" pitchFamily="49" charset="0"/>
+              </a:rPr>
+              <a:t>.</a:t>
+            </a:r>
+            <a:r>
+              <a:rPr lang="en-US" sz="1600" dirty="0" err="1">
+                <a:solidFill>
+                  <a:srgbClr val="DCDCDC"/>
+                </a:solidFill>
+                <a:highlight>
+                  <a:srgbClr val="1E1E1E"/>
+                </a:highlight>
+                <a:latin typeface="Consolas" panose="020B0609020204030204" pitchFamily="49" charset="0"/>
+              </a:rPr>
+              <a:t>Rectangle</a:t>
+            </a:r>
+            <a:r>
+              <a:rPr lang="en-US" sz="1600" dirty="0" err="1">
+                <a:solidFill>
+                  <a:srgbClr val="B4B4B4"/>
+                </a:solidFill>
+                <a:highlight>
+                  <a:srgbClr val="1E1E1E"/>
+                </a:highlight>
+                <a:latin typeface="Consolas" panose="020B0609020204030204" pitchFamily="49" charset="0"/>
+              </a:rPr>
+              <a:t>.</a:t>
+            </a:r>
+            <a:r>
+              <a:rPr lang="en-US" sz="1600" dirty="0" err="1">
+                <a:solidFill>
+                  <a:srgbClr val="DCDCDC"/>
+                </a:solidFill>
+                <a:highlight>
+                  <a:srgbClr val="1E1E1E"/>
+                </a:highlight>
+                <a:latin typeface="Consolas" panose="020B0609020204030204" pitchFamily="49" charset="0"/>
+              </a:rPr>
+              <a:t>Intersects</a:t>
+            </a:r>
+            <a:r>
+              <a:rPr lang="en-US" sz="1600" dirty="0">
+                <a:solidFill>
+                  <a:srgbClr val="DCDCDC"/>
+                </a:solidFill>
+                <a:highlight>
+                  <a:srgbClr val="1E1E1E"/>
+                </a:highlight>
+                <a:latin typeface="Consolas" panose="020B0609020204030204" pitchFamily="49" charset="0"/>
+              </a:rPr>
+              <a:t>(</a:t>
+            </a:r>
+            <a:r>
+              <a:rPr lang="en-US" sz="1600" dirty="0" err="1">
+                <a:solidFill>
+                  <a:srgbClr val="DCDCDC"/>
+                </a:solidFill>
+                <a:highlight>
+                  <a:srgbClr val="1E1E1E"/>
+                </a:highlight>
+                <a:latin typeface="Consolas" panose="020B0609020204030204" pitchFamily="49" charset="0"/>
+              </a:rPr>
+              <a:t>updateBounds</a:t>
+            </a:r>
+            <a:r>
+              <a:rPr lang="en-US" sz="1600" dirty="0" smtClean="0">
+                <a:solidFill>
+                  <a:srgbClr val="DCDCDC"/>
+                </a:solidFill>
+                <a:highlight>
+                  <a:srgbClr val="1E1E1E"/>
+                </a:highlight>
+                <a:latin typeface="Consolas" panose="020B0609020204030204" pitchFamily="49" charset="0"/>
+              </a:rPr>
+              <a:t>)</a:t>
+            </a:r>
+          </a:p>
+          <a:p>
+            <a:r>
+              <a:rPr lang="en-US" sz="1600" dirty="0">
+                <a:solidFill>
+                  <a:srgbClr val="DCDCDC"/>
+                </a:solidFill>
+                <a:highlight>
+                  <a:srgbClr val="1E1E1E"/>
+                </a:highlight>
+                <a:latin typeface="Consolas" panose="020B0609020204030204" pitchFamily="49" charset="0"/>
+              </a:rPr>
+              <a:t> </a:t>
+            </a:r>
+            <a:r>
+              <a:rPr lang="en-US" sz="1600" dirty="0" smtClean="0">
+                <a:solidFill>
+                  <a:srgbClr val="DCDCDC"/>
+                </a:solidFill>
+                <a:highlight>
+                  <a:srgbClr val="1E1E1E"/>
+                </a:highlight>
+                <a:latin typeface="Consolas" panose="020B0609020204030204" pitchFamily="49" charset="0"/>
+              </a:rPr>
+              <a:t>    </a:t>
+            </a:r>
+            <a:r>
+              <a:rPr lang="en-US" sz="1600" dirty="0" smtClean="0">
+                <a:solidFill>
+                  <a:srgbClr val="B4B4B4"/>
+                </a:solidFill>
+                <a:highlight>
+                  <a:srgbClr val="1E1E1E"/>
+                </a:highlight>
+                <a:latin typeface="Consolas" panose="020B0609020204030204" pitchFamily="49" charset="0"/>
+              </a:rPr>
+              <a:t>&amp;&amp;</a:t>
+            </a:r>
+            <a:r>
+              <a:rPr lang="en-US" sz="1600" dirty="0" smtClean="0">
+                <a:solidFill>
+                  <a:srgbClr val="DCDCDC"/>
+                </a:solidFill>
+                <a:highlight>
+                  <a:srgbClr val="1E1E1E"/>
+                </a:highlight>
+                <a:latin typeface="Consolas" panose="020B0609020204030204" pitchFamily="49" charset="0"/>
+              </a:rPr>
+              <a:t> </a:t>
+            </a:r>
+            <a:r>
+              <a:rPr lang="en-US" sz="1600" dirty="0" err="1">
+                <a:solidFill>
+                  <a:srgbClr val="DCDCDC"/>
+                </a:solidFill>
+                <a:highlight>
+                  <a:srgbClr val="1E1E1E"/>
+                </a:highlight>
+                <a:latin typeface="Consolas" panose="020B0609020204030204" pitchFamily="49" charset="0"/>
+              </a:rPr>
+              <a:t>i</a:t>
+            </a:r>
+            <a:r>
+              <a:rPr lang="en-US" sz="1600" dirty="0">
+                <a:solidFill>
+                  <a:srgbClr val="DCDCDC"/>
+                </a:solidFill>
+                <a:highlight>
+                  <a:srgbClr val="1E1E1E"/>
+                </a:highlight>
+                <a:latin typeface="Consolas" panose="020B0609020204030204" pitchFamily="49" charset="0"/>
+              </a:rPr>
+              <a:t> </a:t>
+            </a:r>
+            <a:r>
+              <a:rPr lang="en-US" sz="1600" dirty="0">
+                <a:solidFill>
+                  <a:srgbClr val="569CD6"/>
+                </a:solidFill>
+                <a:highlight>
+                  <a:srgbClr val="1E1E1E"/>
+                </a:highlight>
+                <a:latin typeface="Consolas" panose="020B0609020204030204" pitchFamily="49" charset="0"/>
+              </a:rPr>
+              <a:t>is</a:t>
+            </a:r>
+            <a:r>
+              <a:rPr lang="en-US" sz="1600" dirty="0">
+                <a:solidFill>
+                  <a:srgbClr val="DCDCDC"/>
+                </a:solidFill>
+                <a:highlight>
+                  <a:srgbClr val="1E1E1E"/>
+                </a:highlight>
+                <a:latin typeface="Consolas" panose="020B0609020204030204" pitchFamily="49" charset="0"/>
+              </a:rPr>
+              <a:t> </a:t>
+            </a:r>
+            <a:r>
+              <a:rPr lang="en-US" sz="1600" dirty="0" err="1">
+                <a:solidFill>
+                  <a:srgbClr val="4EC9B0"/>
+                </a:solidFill>
+                <a:highlight>
+                  <a:srgbClr val="1E1E1E"/>
+                </a:highlight>
+                <a:latin typeface="Consolas" panose="020B0609020204030204" pitchFamily="49" charset="0"/>
+              </a:rPr>
+              <a:t>AnimatedObject</a:t>
+            </a:r>
+            <a:r>
+              <a:rPr lang="en-US" sz="1600" dirty="0">
+                <a:solidFill>
+                  <a:srgbClr val="DCDCDC"/>
+                </a:solidFill>
+                <a:highlight>
+                  <a:srgbClr val="1E1E1E"/>
+                </a:highlight>
+                <a:latin typeface="Consolas" panose="020B0609020204030204" pitchFamily="49" charset="0"/>
+              </a:rPr>
+              <a:t> </a:t>
+            </a:r>
+            <a:r>
+              <a:rPr lang="en-US" sz="1600" dirty="0">
+                <a:solidFill>
+                  <a:srgbClr val="B4B4B4"/>
+                </a:solidFill>
+                <a:highlight>
+                  <a:srgbClr val="1E1E1E"/>
+                </a:highlight>
+                <a:latin typeface="Consolas" panose="020B0609020204030204" pitchFamily="49" charset="0"/>
+              </a:rPr>
+              <a:t>&amp;&amp;</a:t>
+            </a:r>
+            <a:r>
+              <a:rPr lang="en-US" sz="1600" dirty="0">
+                <a:solidFill>
+                  <a:srgbClr val="DCDCDC"/>
+                </a:solidFill>
+                <a:highlight>
+                  <a:srgbClr val="1E1E1E"/>
+                </a:highlight>
+                <a:latin typeface="Consolas" panose="020B0609020204030204" pitchFamily="49" charset="0"/>
+              </a:rPr>
+              <a:t> </a:t>
+            </a:r>
+            <a:r>
+              <a:rPr lang="en-US" sz="1600" dirty="0">
+                <a:solidFill>
+                  <a:srgbClr val="B4B4B4"/>
+                </a:solidFill>
+                <a:highlight>
+                  <a:srgbClr val="1E1E1E"/>
+                </a:highlight>
+                <a:latin typeface="Consolas" panose="020B0609020204030204" pitchFamily="49" charset="0"/>
+              </a:rPr>
+              <a:t>!</a:t>
+            </a:r>
+            <a:r>
+              <a:rPr lang="en-US" sz="1600" dirty="0">
+                <a:solidFill>
+                  <a:srgbClr val="DCDCDC"/>
+                </a:solidFill>
+                <a:highlight>
+                  <a:srgbClr val="1E1E1E"/>
+                </a:highlight>
+                <a:latin typeface="Consolas" panose="020B0609020204030204" pitchFamily="49" charset="0"/>
+              </a:rPr>
+              <a:t>(</a:t>
+            </a:r>
+            <a:r>
+              <a:rPr lang="en-US" sz="1600" dirty="0" err="1">
+                <a:solidFill>
+                  <a:srgbClr val="DCDCDC"/>
+                </a:solidFill>
+                <a:highlight>
+                  <a:srgbClr val="1E1E1E"/>
+                </a:highlight>
+                <a:latin typeface="Consolas" panose="020B0609020204030204" pitchFamily="49" charset="0"/>
+              </a:rPr>
+              <a:t>i</a:t>
+            </a:r>
+            <a:r>
+              <a:rPr lang="en-US" sz="1600" dirty="0">
+                <a:solidFill>
+                  <a:srgbClr val="DCDCDC"/>
+                </a:solidFill>
+                <a:highlight>
+                  <a:srgbClr val="1E1E1E"/>
+                </a:highlight>
+                <a:latin typeface="Consolas" panose="020B0609020204030204" pitchFamily="49" charset="0"/>
+              </a:rPr>
+              <a:t> </a:t>
+            </a:r>
+            <a:r>
+              <a:rPr lang="en-US" sz="1600" dirty="0">
+                <a:solidFill>
+                  <a:srgbClr val="569CD6"/>
+                </a:solidFill>
+                <a:highlight>
+                  <a:srgbClr val="1E1E1E"/>
+                </a:highlight>
+                <a:latin typeface="Consolas" panose="020B0609020204030204" pitchFamily="49" charset="0"/>
+              </a:rPr>
+              <a:t>is</a:t>
+            </a:r>
+            <a:r>
+              <a:rPr lang="en-US" sz="1600" dirty="0">
+                <a:solidFill>
+                  <a:srgbClr val="DCDCDC"/>
+                </a:solidFill>
+                <a:highlight>
+                  <a:srgbClr val="1E1E1E"/>
+                </a:highlight>
+                <a:latin typeface="Consolas" panose="020B0609020204030204" pitchFamily="49" charset="0"/>
+              </a:rPr>
+              <a:t> </a:t>
+            </a:r>
+            <a:r>
+              <a:rPr lang="en-US" sz="1600" dirty="0">
+                <a:solidFill>
+                  <a:srgbClr val="4EC9B0"/>
+                </a:solidFill>
+                <a:highlight>
+                  <a:srgbClr val="1E1E1E"/>
+                </a:highlight>
+                <a:latin typeface="Consolas" panose="020B0609020204030204" pitchFamily="49" charset="0"/>
+              </a:rPr>
+              <a:t>Player</a:t>
+            </a:r>
+            <a:r>
+              <a:rPr lang="en-US" sz="1600" dirty="0">
+                <a:solidFill>
+                  <a:srgbClr val="DCDCDC"/>
+                </a:solidFill>
+                <a:highlight>
+                  <a:srgbClr val="1E1E1E"/>
+                </a:highlight>
+                <a:latin typeface="Consolas" panose="020B0609020204030204" pitchFamily="49" charset="0"/>
+              </a:rPr>
+              <a:t>))</a:t>
+            </a:r>
+          </a:p>
+          <a:p>
+            <a:r>
+              <a:rPr lang="en-US" sz="1600" dirty="0" smtClean="0">
+                <a:solidFill>
+                  <a:srgbClr val="B4B4B4"/>
+                </a:solidFill>
+                <a:highlight>
+                  <a:srgbClr val="1E1E1E"/>
+                </a:highlight>
+                <a:latin typeface="Consolas" panose="020B0609020204030204" pitchFamily="49" charset="0"/>
+              </a:rPr>
+              <a:t> .</a:t>
+            </a:r>
+            <a:r>
+              <a:rPr lang="en-US" sz="1600" dirty="0">
+                <a:solidFill>
+                  <a:srgbClr val="DCDCDC"/>
+                </a:solidFill>
+                <a:highlight>
+                  <a:srgbClr val="1E1E1E"/>
+                </a:highlight>
+                <a:latin typeface="Consolas" panose="020B0609020204030204" pitchFamily="49" charset="0"/>
+              </a:rPr>
+              <a:t>Select(</a:t>
+            </a:r>
+            <a:r>
+              <a:rPr lang="en-US" sz="1600" dirty="0" err="1">
+                <a:solidFill>
+                  <a:srgbClr val="DCDCDC"/>
+                </a:solidFill>
+                <a:highlight>
+                  <a:srgbClr val="1E1E1E"/>
+                </a:highlight>
+                <a:latin typeface="Consolas" panose="020B0609020204030204" pitchFamily="49" charset="0"/>
+              </a:rPr>
+              <a:t>i</a:t>
+            </a:r>
+            <a:r>
+              <a:rPr lang="en-US" sz="1600" dirty="0">
+                <a:solidFill>
+                  <a:srgbClr val="DCDCDC"/>
+                </a:solidFill>
+                <a:highlight>
+                  <a:srgbClr val="1E1E1E"/>
+                </a:highlight>
+                <a:latin typeface="Consolas" panose="020B0609020204030204" pitchFamily="49" charset="0"/>
+              </a:rPr>
+              <a:t> </a:t>
+            </a:r>
+            <a:r>
+              <a:rPr lang="en-US" sz="1600" dirty="0">
+                <a:solidFill>
+                  <a:srgbClr val="B4B4B4"/>
+                </a:solidFill>
+                <a:highlight>
+                  <a:srgbClr val="1E1E1E"/>
+                </a:highlight>
+                <a:latin typeface="Consolas" panose="020B0609020204030204" pitchFamily="49" charset="0"/>
+              </a:rPr>
+              <a:t>=&gt;</a:t>
+            </a:r>
+            <a:r>
+              <a:rPr lang="en-US" sz="1600" dirty="0">
+                <a:solidFill>
+                  <a:srgbClr val="DCDCDC"/>
+                </a:solidFill>
+                <a:highlight>
+                  <a:srgbClr val="1E1E1E"/>
+                </a:highlight>
+                <a:latin typeface="Consolas" panose="020B0609020204030204" pitchFamily="49" charset="0"/>
+              </a:rPr>
+              <a:t> (</a:t>
+            </a:r>
+            <a:r>
+              <a:rPr lang="en-US" sz="1600" dirty="0" err="1">
+                <a:solidFill>
+                  <a:srgbClr val="4EC9B0"/>
+                </a:solidFill>
+                <a:highlight>
+                  <a:srgbClr val="1E1E1E"/>
+                </a:highlight>
+                <a:latin typeface="Consolas" panose="020B0609020204030204" pitchFamily="49" charset="0"/>
+              </a:rPr>
+              <a:t>AnimatedObject</a:t>
+            </a:r>
+            <a:r>
+              <a:rPr lang="en-US" sz="1600" dirty="0">
+                <a:solidFill>
+                  <a:srgbClr val="DCDCDC"/>
+                </a:solidFill>
+                <a:highlight>
+                  <a:srgbClr val="1E1E1E"/>
+                </a:highlight>
+                <a:latin typeface="Consolas" panose="020B0609020204030204" pitchFamily="49" charset="0"/>
+              </a:rPr>
+              <a:t>)</a:t>
+            </a:r>
+            <a:r>
+              <a:rPr lang="en-US" sz="1600" dirty="0" err="1">
+                <a:solidFill>
+                  <a:srgbClr val="DCDCDC"/>
+                </a:solidFill>
+                <a:highlight>
+                  <a:srgbClr val="1E1E1E"/>
+                </a:highlight>
+                <a:latin typeface="Consolas" panose="020B0609020204030204" pitchFamily="49" charset="0"/>
+              </a:rPr>
+              <a:t>i</a:t>
+            </a:r>
+            <a:r>
+              <a:rPr lang="en-US" sz="1600" dirty="0">
+                <a:solidFill>
+                  <a:srgbClr val="DCDCDC"/>
+                </a:solidFill>
+                <a:highlight>
+                  <a:srgbClr val="1E1E1E"/>
+                </a:highlight>
+                <a:latin typeface="Consolas" panose="020B0609020204030204" pitchFamily="49" charset="0"/>
+              </a:rPr>
+              <a:t>)</a:t>
+            </a:r>
+            <a:r>
+              <a:rPr lang="en-US" sz="1600" dirty="0">
+                <a:solidFill>
+                  <a:srgbClr val="B4B4B4"/>
+                </a:solidFill>
+                <a:highlight>
+                  <a:srgbClr val="1E1E1E"/>
+                </a:highlight>
+                <a:latin typeface="Consolas" panose="020B0609020204030204" pitchFamily="49" charset="0"/>
+              </a:rPr>
+              <a:t>.</a:t>
+            </a:r>
+            <a:r>
+              <a:rPr lang="en-US" sz="1600" dirty="0" err="1">
+                <a:solidFill>
+                  <a:srgbClr val="DCDCDC"/>
+                </a:solidFill>
+                <a:highlight>
+                  <a:srgbClr val="1E1E1E"/>
+                </a:highlight>
+                <a:latin typeface="Consolas" panose="020B0609020204030204" pitchFamily="49" charset="0"/>
+              </a:rPr>
+              <a:t>ToList</a:t>
+            </a:r>
+            <a:r>
+              <a:rPr lang="en-US" sz="1600" dirty="0" smtClean="0">
+                <a:solidFill>
+                  <a:srgbClr val="DCDCDC"/>
+                </a:solidFill>
+                <a:highlight>
+                  <a:srgbClr val="1E1E1E"/>
+                </a:highlight>
+                <a:latin typeface="Consolas" panose="020B0609020204030204" pitchFamily="49" charset="0"/>
+              </a:rPr>
+              <a:t>();</a:t>
+            </a:r>
+            <a:endParaRPr lang="en-US" sz="1600" dirty="0">
+              <a:solidFill>
+                <a:srgbClr val="DCDCDC"/>
+              </a:solidFill>
+              <a:highlight>
+                <a:srgbClr val="1E1E1E"/>
+              </a:highlight>
+              <a:latin typeface="Consolas" panose="020B0609020204030204" pitchFamily="49" charset="0"/>
+            </a:endParaRPr>
+          </a:p>
+          <a:p>
+            <a:endParaRPr lang="en-US" sz="1600" dirty="0" smtClean="0">
+              <a:solidFill>
+                <a:srgbClr val="4EC9B0"/>
+              </a:solidFill>
+              <a:highlight>
+                <a:srgbClr val="1E1E1E"/>
+              </a:highlight>
+              <a:latin typeface="Consolas" panose="020B0609020204030204" pitchFamily="49" charset="0"/>
+            </a:endParaRPr>
+          </a:p>
+          <a:p>
+            <a:r>
+              <a:rPr lang="en-US" sz="1600" dirty="0" smtClean="0">
+                <a:solidFill>
+                  <a:srgbClr val="4EC9B0"/>
+                </a:solidFill>
+                <a:highlight>
+                  <a:srgbClr val="1E1E1E"/>
+                </a:highlight>
+                <a:latin typeface="Consolas" panose="020B0609020204030204" pitchFamily="49" charset="0"/>
+              </a:rPr>
+              <a:t> </a:t>
+            </a:r>
+            <a:r>
+              <a:rPr lang="en-US" sz="1600" dirty="0" err="1" smtClean="0">
+                <a:solidFill>
+                  <a:srgbClr val="4EC9B0"/>
+                </a:solidFill>
+                <a:highlight>
+                  <a:srgbClr val="1E1E1E"/>
+                </a:highlight>
+                <a:latin typeface="Consolas" panose="020B0609020204030204" pitchFamily="49" charset="0"/>
+              </a:rPr>
+              <a:t>Parallel</a:t>
+            </a:r>
+            <a:r>
+              <a:rPr lang="en-US" sz="1600" dirty="0" err="1" smtClean="0">
+                <a:solidFill>
+                  <a:srgbClr val="B4B4B4"/>
+                </a:solidFill>
+                <a:highlight>
+                  <a:srgbClr val="1E1E1E"/>
+                </a:highlight>
+                <a:latin typeface="Consolas" panose="020B0609020204030204" pitchFamily="49" charset="0"/>
+              </a:rPr>
+              <a:t>.</a:t>
+            </a:r>
+            <a:r>
+              <a:rPr lang="en-US" sz="1600" dirty="0" err="1" smtClean="0">
+                <a:solidFill>
+                  <a:srgbClr val="DCDCDC"/>
+                </a:solidFill>
+                <a:highlight>
+                  <a:srgbClr val="1E1E1E"/>
+                </a:highlight>
+                <a:latin typeface="Consolas" panose="020B0609020204030204" pitchFamily="49" charset="0"/>
+              </a:rPr>
+              <a:t>ForEach</a:t>
+            </a:r>
+            <a:r>
+              <a:rPr lang="en-US" sz="1600" dirty="0" smtClean="0">
+                <a:solidFill>
+                  <a:srgbClr val="DCDCDC"/>
+                </a:solidFill>
+                <a:highlight>
+                  <a:srgbClr val="1E1E1E"/>
+                </a:highlight>
+                <a:latin typeface="Consolas" panose="020B0609020204030204" pitchFamily="49" charset="0"/>
+              </a:rPr>
+              <a:t>(</a:t>
+            </a:r>
+            <a:r>
+              <a:rPr lang="en-US" sz="1600" dirty="0" err="1" smtClean="0">
+                <a:solidFill>
+                  <a:srgbClr val="DCDCDC"/>
+                </a:solidFill>
+                <a:highlight>
+                  <a:srgbClr val="1E1E1E"/>
+                </a:highlight>
+                <a:latin typeface="Consolas" panose="020B0609020204030204" pitchFamily="49" charset="0"/>
+              </a:rPr>
+              <a:t>gameObjects</a:t>
+            </a:r>
+            <a:r>
+              <a:rPr lang="en-US" sz="1600" dirty="0">
+                <a:solidFill>
+                  <a:srgbClr val="DCDCDC"/>
+                </a:solidFill>
+                <a:highlight>
+                  <a:srgbClr val="1E1E1E"/>
+                </a:highlight>
+                <a:latin typeface="Consolas" panose="020B0609020204030204" pitchFamily="49" charset="0"/>
+              </a:rPr>
+              <a:t>, </a:t>
+            </a:r>
+            <a:r>
+              <a:rPr lang="en-US" sz="1600" dirty="0" err="1">
+                <a:solidFill>
+                  <a:srgbClr val="DCDCDC"/>
+                </a:solidFill>
+                <a:highlight>
+                  <a:srgbClr val="1E1E1E"/>
+                </a:highlight>
+                <a:latin typeface="Consolas" panose="020B0609020204030204" pitchFamily="49" charset="0"/>
+              </a:rPr>
+              <a:t>i</a:t>
+            </a:r>
+            <a:r>
+              <a:rPr lang="en-US" sz="1600" dirty="0">
+                <a:solidFill>
+                  <a:srgbClr val="DCDCDC"/>
+                </a:solidFill>
+                <a:highlight>
+                  <a:srgbClr val="1E1E1E"/>
+                </a:highlight>
+                <a:latin typeface="Consolas" panose="020B0609020204030204" pitchFamily="49" charset="0"/>
+              </a:rPr>
+              <a:t> </a:t>
+            </a:r>
+            <a:r>
+              <a:rPr lang="en-US" sz="1600" dirty="0">
+                <a:solidFill>
+                  <a:srgbClr val="B4B4B4"/>
+                </a:solidFill>
+                <a:highlight>
+                  <a:srgbClr val="1E1E1E"/>
+                </a:highlight>
+                <a:latin typeface="Consolas" panose="020B0609020204030204" pitchFamily="49" charset="0"/>
+              </a:rPr>
+              <a:t>=&gt;</a:t>
+            </a:r>
+            <a:r>
+              <a:rPr lang="en-US" sz="1600" dirty="0">
+                <a:solidFill>
+                  <a:srgbClr val="DCDCDC"/>
+                </a:solidFill>
+                <a:highlight>
+                  <a:srgbClr val="1E1E1E"/>
+                </a:highlight>
+                <a:latin typeface="Consolas" panose="020B0609020204030204" pitchFamily="49" charset="0"/>
+              </a:rPr>
+              <a:t> </a:t>
+            </a:r>
+            <a:r>
+              <a:rPr lang="en-US" sz="1600" dirty="0" err="1">
+                <a:solidFill>
+                  <a:srgbClr val="DCDCDC"/>
+                </a:solidFill>
+                <a:highlight>
+                  <a:srgbClr val="1E1E1E"/>
+                </a:highlight>
+                <a:latin typeface="Consolas" panose="020B0609020204030204" pitchFamily="49" charset="0"/>
+              </a:rPr>
+              <a:t>i</a:t>
+            </a:r>
+            <a:r>
+              <a:rPr lang="en-US" sz="1600" dirty="0" err="1">
+                <a:solidFill>
+                  <a:srgbClr val="B4B4B4"/>
+                </a:solidFill>
+                <a:highlight>
+                  <a:srgbClr val="1E1E1E"/>
+                </a:highlight>
+                <a:latin typeface="Consolas" panose="020B0609020204030204" pitchFamily="49" charset="0"/>
+              </a:rPr>
+              <a:t>.</a:t>
+            </a:r>
+            <a:r>
+              <a:rPr lang="en-US" sz="1600" dirty="0" err="1">
+                <a:solidFill>
+                  <a:srgbClr val="DCDCDC"/>
+                </a:solidFill>
+                <a:highlight>
+                  <a:srgbClr val="1E1E1E"/>
+                </a:highlight>
+                <a:latin typeface="Consolas" panose="020B0609020204030204" pitchFamily="49" charset="0"/>
+              </a:rPr>
+              <a:t>Update</a:t>
+            </a:r>
+            <a:r>
+              <a:rPr lang="en-US" sz="1600" dirty="0">
+                <a:solidFill>
+                  <a:srgbClr val="DCDCDC"/>
+                </a:solidFill>
+                <a:highlight>
+                  <a:srgbClr val="1E1E1E"/>
+                </a:highlight>
+                <a:latin typeface="Consolas" panose="020B0609020204030204" pitchFamily="49" charset="0"/>
+              </a:rPr>
+              <a:t>(</a:t>
+            </a:r>
+            <a:r>
+              <a:rPr lang="en-US" sz="1600" dirty="0" err="1">
+                <a:solidFill>
+                  <a:srgbClr val="DCDCDC"/>
+                </a:solidFill>
+                <a:highlight>
+                  <a:srgbClr val="1E1E1E"/>
+                </a:highlight>
+                <a:latin typeface="Consolas" panose="020B0609020204030204" pitchFamily="49" charset="0"/>
+              </a:rPr>
+              <a:t>GamePlay</a:t>
+            </a:r>
+            <a:r>
+              <a:rPr lang="en-US" sz="1600" dirty="0" err="1">
+                <a:solidFill>
+                  <a:srgbClr val="B4B4B4"/>
+                </a:solidFill>
+                <a:highlight>
+                  <a:srgbClr val="1E1E1E"/>
+                </a:highlight>
+                <a:latin typeface="Consolas" panose="020B0609020204030204" pitchFamily="49" charset="0"/>
+              </a:rPr>
+              <a:t>.</a:t>
+            </a:r>
+            <a:r>
+              <a:rPr lang="en-US" sz="1600" dirty="0" err="1">
+                <a:solidFill>
+                  <a:srgbClr val="DCDCDC"/>
+                </a:solidFill>
+                <a:highlight>
+                  <a:srgbClr val="1E1E1E"/>
+                </a:highlight>
+                <a:latin typeface="Consolas" panose="020B0609020204030204" pitchFamily="49" charset="0"/>
+              </a:rPr>
+              <a:t>LevelObjects</a:t>
+            </a:r>
+            <a:r>
+              <a:rPr lang="en-US" sz="1600" dirty="0">
+                <a:solidFill>
+                  <a:srgbClr val="DCDCDC"/>
+                </a:solidFill>
+                <a:highlight>
+                  <a:srgbClr val="1E1E1E"/>
+                </a:highlight>
+                <a:latin typeface="Consolas" panose="020B0609020204030204" pitchFamily="49" charset="0"/>
+              </a:rPr>
+              <a:t>, elapsed));</a:t>
+            </a:r>
+          </a:p>
+          <a:p>
+            <a:r>
+              <a:rPr lang="en-US" sz="1600" dirty="0" smtClean="0">
+                <a:solidFill>
+                  <a:srgbClr val="DCDCDC"/>
+                </a:solidFill>
+                <a:highlight>
+                  <a:srgbClr val="1E1E1E"/>
+                </a:highlight>
+                <a:latin typeface="Consolas" panose="020B0609020204030204" pitchFamily="49" charset="0"/>
+              </a:rPr>
+              <a:t>}</a:t>
+            </a:r>
+            <a:endParaRPr lang="en-US" sz="1600" dirty="0"/>
           </a:p>
         </p:txBody>
       </p:sp>
     </p:spTree>
     <p:extLst>
       <p:ext uri="{BB962C8B-B14F-4D97-AF65-F5344CB8AC3E}">
-        <p14:creationId xmlns:p14="http://schemas.microsoft.com/office/powerpoint/2010/main" val="1782814773"/>
+        <p14:creationId xmlns:p14="http://schemas.microsoft.com/office/powerpoint/2010/main" val="3550370794"/>
       </p:ext>
     </p:extLst>
   </p:cSld>
   <p:clrMapOvr>
     <a:masterClrMapping/>
   </p:clrMapOvr>
+  <p:timing>
+    <p:tnLst>
+      <p:par>
+        <p:cTn id="1" dur="indefinite" restart="never" nodeType="tmRoot"/>
+      </p:par>
+    </p:tnLst>
+  </p:timing>
 </p:sld>
 </file>
 

</xml_diff>